<commit_message>
Update server service system
This commit cleans up a lot. The StoreUpdateService gets replaced by the DatabaseService. The ChatHistoryService is not needed anymore. The MessageManager replaces the SendQueue and the StoreQueue. The TransferMessage and the DatabaseMessage are now merged to one single class. See organization/server/RSA-App.pptx for more information.
</commit_message>
<xml_diff>
--- a/organization/server/RSA-App.pptx
+++ b/organization/server/RSA-App.pptx
@@ -10,7 +10,7 @@
     <p:sldId id="261" r:id="rId4"/>
     <p:sldId id="262" r:id="rId5"/>
     <p:sldId id="257" r:id="rId6"/>
-    <p:sldId id="260" r:id="rId7"/>
+    <p:sldId id="263" r:id="rId7"/>
   </p:sldIdLst>
   <p:sldSz cx="12192000" cy="6858000"/>
   <p:notesSz cx="6858000" cy="9144000"/>
@@ -11467,62 +11467,6 @@
           </a:fontRef>
         </p:style>
       </p:cxnSp>
-      <p:sp>
-        <p:nvSpPr>
-          <p:cNvPr id="42" name="Rechteck 41">
-            <a:extLst>
-              <a:ext uri="{FF2B5EF4-FFF2-40B4-BE49-F238E27FC236}">
-                <a16:creationId xmlns:a16="http://schemas.microsoft.com/office/drawing/2014/main" id="{3D54A2EA-8C2B-4B01-86C1-8146A318E477}"/>
-              </a:ext>
-            </a:extLst>
-          </p:cNvPr>
-          <p:cNvSpPr/>
-          <p:nvPr/>
-        </p:nvSpPr>
-        <p:spPr>
-          <a:xfrm>
-            <a:off x="2102881" y="3948982"/>
-            <a:ext cx="1337261" cy="716970"/>
-          </a:xfrm>
-          <a:prstGeom prst="rect">
-            <a:avLst/>
-          </a:prstGeom>
-        </p:spPr>
-        <p:style>
-          <a:lnRef idx="2">
-            <a:schemeClr val="accent6">
-              <a:shade val="50000"/>
-            </a:schemeClr>
-          </a:lnRef>
-          <a:fillRef idx="1">
-            <a:schemeClr val="accent6"/>
-          </a:fillRef>
-          <a:effectRef idx="0">
-            <a:schemeClr val="accent6"/>
-          </a:effectRef>
-          <a:fontRef idx="minor">
-            <a:schemeClr val="lt1"/>
-          </a:fontRef>
-        </p:style>
-        <p:txBody>
-          <a:bodyPr rtlCol="0" anchor="ctr"/>
-          <a:lstStyle/>
-          <a:p>
-            <a:pPr algn="ctr"/>
-            <a:r>
-              <a:rPr lang="de-DE" sz="1400" err="1">
-                <a:latin typeface="Roboto Medium" panose="02000000000000000000" pitchFamily="2" charset="0"/>
-                <a:ea typeface="Roboto Medium" panose="02000000000000000000" pitchFamily="2" charset="0"/>
-              </a:rPr>
-              <a:t>ReadService</a:t>
-            </a:r>
-            <a:endParaRPr lang="de-DE" sz="1400">
-              <a:latin typeface="Roboto Medium" panose="02000000000000000000" pitchFamily="2" charset="0"/>
-              <a:ea typeface="Roboto Medium" panose="02000000000000000000" pitchFamily="2" charset="0"/>
-            </a:endParaRPr>
-          </a:p>
-        </p:txBody>
-      </p:sp>
       <p:cxnSp>
         <p:nvCxnSpPr>
           <p:cNvPr id="44" name="Verbinder: gewinkelt 43">
@@ -11563,98 +11507,6 @@
           </a:fillRef>
           <a:effectRef idx="0">
             <a:schemeClr val="accent6"/>
-          </a:effectRef>
-          <a:fontRef idx="minor">
-            <a:schemeClr val="tx1"/>
-          </a:fontRef>
-        </p:style>
-      </p:cxnSp>
-      <p:cxnSp>
-        <p:nvCxnSpPr>
-          <p:cNvPr id="48" name="Verbinder: gewinkelt 47">
-            <a:extLst>
-              <a:ext uri="{FF2B5EF4-FFF2-40B4-BE49-F238E27FC236}">
-                <a16:creationId xmlns:a16="http://schemas.microsoft.com/office/drawing/2014/main" id="{9D6B6128-E7CE-4385-B96D-CA604C03C2AF}"/>
-              </a:ext>
-            </a:extLst>
-          </p:cNvPr>
-          <p:cNvCxnSpPr>
-            <a:cxnSpLocks/>
-            <a:stCxn id="13" idx="1"/>
-            <a:endCxn id="21" idx="0"/>
-          </p:cNvCxnSpPr>
-          <p:nvPr/>
-        </p:nvCxnSpPr>
-        <p:spPr>
-          <a:xfrm rot="10800000" flipV="1">
-            <a:off x="3136085" y="815526"/>
-            <a:ext cx="165381" cy="1809672"/>
-          </a:xfrm>
-          <a:prstGeom prst="bentConnector2">
-            <a:avLst/>
-          </a:prstGeom>
-          <a:ln w="57150">
-            <a:solidFill>
-              <a:srgbClr val="00B0F0"/>
-            </a:solidFill>
-            <a:tailEnd type="triangle"/>
-          </a:ln>
-        </p:spPr>
-        <p:style>
-          <a:lnRef idx="1">
-            <a:schemeClr val="accent1"/>
-          </a:lnRef>
-          <a:fillRef idx="0">
-            <a:schemeClr val="accent1"/>
-          </a:fillRef>
-          <a:effectRef idx="0">
-            <a:schemeClr val="accent1"/>
-          </a:effectRef>
-          <a:fontRef idx="minor">
-            <a:schemeClr val="tx1"/>
-          </a:fontRef>
-        </p:style>
-      </p:cxnSp>
-      <p:cxnSp>
-        <p:nvCxnSpPr>
-          <p:cNvPr id="50" name="Verbinder: gewinkelt 49">
-            <a:extLst>
-              <a:ext uri="{FF2B5EF4-FFF2-40B4-BE49-F238E27FC236}">
-                <a16:creationId xmlns:a16="http://schemas.microsoft.com/office/drawing/2014/main" id="{13BDA07A-02E7-4AC7-9F6E-B46708C87D9F}"/>
-              </a:ext>
-            </a:extLst>
-          </p:cNvPr>
-          <p:cNvCxnSpPr>
-            <a:cxnSpLocks/>
-            <a:stCxn id="14" idx="1"/>
-            <a:endCxn id="21" idx="0"/>
-          </p:cNvCxnSpPr>
-          <p:nvPr/>
-        </p:nvCxnSpPr>
-        <p:spPr>
-          <a:xfrm rot="10800000" flipV="1">
-            <a:off x="3136085" y="1733344"/>
-            <a:ext cx="165381" cy="891853"/>
-          </a:xfrm>
-          <a:prstGeom prst="bentConnector2">
-            <a:avLst/>
-          </a:prstGeom>
-          <a:ln w="57150">
-            <a:solidFill>
-              <a:srgbClr val="00B0F0"/>
-            </a:solidFill>
-            <a:tailEnd type="triangle"/>
-          </a:ln>
-        </p:spPr>
-        <p:style>
-          <a:lnRef idx="1">
-            <a:schemeClr val="accent1"/>
-          </a:lnRef>
-          <a:fillRef idx="0">
-            <a:schemeClr val="accent1"/>
-          </a:fillRef>
-          <a:effectRef idx="0">
-            <a:schemeClr val="accent1"/>
           </a:effectRef>
           <a:fontRef idx="minor">
             <a:schemeClr val="tx1"/>
@@ -11739,10 +11591,10 @@
       </p:sp>
       <p:sp>
         <p:nvSpPr>
-          <p:cNvPr id="21" name="Rechteck 20">
-            <a:extLst>
-              <a:ext uri="{FF2B5EF4-FFF2-40B4-BE49-F238E27FC236}">
-                <a16:creationId xmlns:a16="http://schemas.microsoft.com/office/drawing/2014/main" id="{14FF07BE-4622-4C58-8AD8-E674962EEF14}"/>
+          <p:cNvPr id="22" name="Rechteck 21">
+            <a:extLst>
+              <a:ext uri="{FF2B5EF4-FFF2-40B4-BE49-F238E27FC236}">
+                <a16:creationId xmlns:a16="http://schemas.microsoft.com/office/drawing/2014/main" id="{31A45673-A05A-4F32-ABDA-7EED3F5AC1A4}"/>
               </a:ext>
             </a:extLst>
           </p:cNvPr>
@@ -11751,10 +11603,160 @@
         </p:nvSpPr>
         <p:spPr>
           <a:xfrm>
-            <a:off x="2529713" y="2625198"/>
+            <a:off x="2102881" y="3117822"/>
+            <a:ext cx="2664911" cy="1548130"/>
+          </a:xfrm>
+          <a:prstGeom prst="rect">
+            <a:avLst/>
+          </a:prstGeom>
+        </p:spPr>
+        <p:style>
+          <a:lnRef idx="2">
+            <a:schemeClr val="accent6">
+              <a:shade val="50000"/>
+            </a:schemeClr>
+          </a:lnRef>
+          <a:fillRef idx="1">
+            <a:schemeClr val="accent6"/>
+          </a:fillRef>
+          <a:effectRef idx="0">
+            <a:schemeClr val="accent6"/>
+          </a:effectRef>
+          <a:fontRef idx="minor">
+            <a:schemeClr val="lt1"/>
+          </a:fontRef>
+        </p:style>
+        <p:txBody>
+          <a:bodyPr rtlCol="0" anchor="ctr"/>
+          <a:lstStyle/>
+          <a:p>
+            <a:pPr algn="ctr"/>
+            <a:r>
+              <a:rPr lang="de-DE" sz="1400">
+                <a:latin typeface="Roboto Medium" panose="02000000000000000000" pitchFamily="2" charset="0"/>
+                <a:ea typeface="Roboto Medium" panose="02000000000000000000" pitchFamily="2" charset="0"/>
+              </a:rPr>
+              <a:t>DatabaseService</a:t>
+            </a:r>
+          </a:p>
+        </p:txBody>
+      </p:sp>
+      <p:sp>
+        <p:nvSpPr>
+          <p:cNvPr id="67" name="Rechteck 66">
+            <a:extLst>
+              <a:ext uri="{FF2B5EF4-FFF2-40B4-BE49-F238E27FC236}">
+                <a16:creationId xmlns:a16="http://schemas.microsoft.com/office/drawing/2014/main" id="{1D7A00AE-CB40-437A-9A88-11C904B2A2DE}"/>
+              </a:ext>
+            </a:extLst>
+          </p:cNvPr>
+          <p:cNvSpPr/>
+          <p:nvPr/>
+        </p:nvSpPr>
+        <p:spPr>
+          <a:xfrm>
+            <a:off x="2176193" y="5444415"/>
             <a:ext cx="1212742" cy="716970"/>
           </a:xfrm>
           <a:prstGeom prst="rect">
+            <a:avLst/>
+          </a:prstGeom>
+        </p:spPr>
+        <p:style>
+          <a:lnRef idx="2">
+            <a:schemeClr val="accent3">
+              <a:shade val="50000"/>
+            </a:schemeClr>
+          </a:lnRef>
+          <a:fillRef idx="1">
+            <a:schemeClr val="accent3"/>
+          </a:fillRef>
+          <a:effectRef idx="0">
+            <a:schemeClr val="accent3"/>
+          </a:effectRef>
+          <a:fontRef idx="minor">
+            <a:schemeClr val="lt1"/>
+          </a:fontRef>
+        </p:style>
+        <p:txBody>
+          <a:bodyPr rtlCol="0" anchor="ctr"/>
+          <a:lstStyle/>
+          <a:p>
+            <a:pPr algn="ctr"/>
+            <a:r>
+              <a:rPr lang="de-DE" sz="1400">
+                <a:latin typeface="Roboto Medium" panose="02000000000000000000" pitchFamily="2" charset="0"/>
+                <a:ea typeface="Roboto Medium" panose="02000000000000000000" pitchFamily="2" charset="0"/>
+              </a:rPr>
+              <a:t>DBManager</a:t>
+            </a:r>
+          </a:p>
+        </p:txBody>
+      </p:sp>
+      <p:cxnSp>
+        <p:nvCxnSpPr>
+          <p:cNvPr id="71" name="Verbinder: gewinkelt 70">
+            <a:extLst>
+              <a:ext uri="{FF2B5EF4-FFF2-40B4-BE49-F238E27FC236}">
+                <a16:creationId xmlns:a16="http://schemas.microsoft.com/office/drawing/2014/main" id="{238E2458-EBDA-4860-8281-03FB6D10CF1E}"/>
+              </a:ext>
+            </a:extLst>
+          </p:cNvPr>
+          <p:cNvCxnSpPr>
+            <a:cxnSpLocks/>
+            <a:stCxn id="22" idx="2"/>
+            <a:endCxn id="67" idx="3"/>
+          </p:cNvCxnSpPr>
+          <p:nvPr/>
+        </p:nvCxnSpPr>
+        <p:spPr>
+          <a:xfrm rot="5400000">
+            <a:off x="2843662" y="5211225"/>
+            <a:ext cx="1136948" cy="46402"/>
+          </a:xfrm>
+          <a:prstGeom prst="bentConnector2">
+            <a:avLst/>
+          </a:prstGeom>
+          <a:ln w="57150">
+            <a:solidFill>
+              <a:srgbClr val="00B0F0"/>
+            </a:solidFill>
+            <a:tailEnd type="triangle"/>
+          </a:ln>
+        </p:spPr>
+        <p:style>
+          <a:lnRef idx="1">
+            <a:schemeClr val="accent1"/>
+          </a:lnRef>
+          <a:fillRef idx="0">
+            <a:schemeClr val="accent1"/>
+          </a:fillRef>
+          <a:effectRef idx="0">
+            <a:schemeClr val="accent1"/>
+          </a:effectRef>
+          <a:fontRef idx="minor">
+            <a:schemeClr val="tx1"/>
+          </a:fontRef>
+        </p:style>
+      </p:cxnSp>
+      <p:sp>
+        <p:nvSpPr>
+          <p:cNvPr id="80" name="Gleichschenkliges Dreieck 79">
+            <a:extLst>
+              <a:ext uri="{FF2B5EF4-FFF2-40B4-BE49-F238E27FC236}">
+                <a16:creationId xmlns:a16="http://schemas.microsoft.com/office/drawing/2014/main" id="{AA488369-24D7-4D98-8C9A-0AB281F4F80D}"/>
+              </a:ext>
+            </a:extLst>
+          </p:cNvPr>
+          <p:cNvSpPr/>
+          <p:nvPr/>
+        </p:nvSpPr>
+        <p:spPr>
+          <a:xfrm rot="5400000">
+            <a:off x="-1630109" y="2369276"/>
+            <a:ext cx="4727138" cy="869546"/>
+          </a:xfrm>
+          <a:prstGeom prst="triangle">
             <a:avLst/>
           </a:prstGeom>
         </p:spPr>
@@ -11780,167 +11782,54 @@
           <a:p>
             <a:pPr algn="ctr"/>
             <a:r>
-              <a:rPr lang="de-DE" sz="1400" err="1">
-                <a:latin typeface="Roboto Medium" panose="02000000000000000000" pitchFamily="2" charset="0"/>
-                <a:ea typeface="Roboto Medium" panose="02000000000000000000" pitchFamily="2" charset="0"/>
-              </a:rPr>
-              <a:t>StoreQueue</a:t>
-            </a:r>
-            <a:endParaRPr lang="de-DE" sz="1400">
-              <a:latin typeface="Roboto Medium" panose="02000000000000000000" pitchFamily="2" charset="0"/>
-              <a:ea typeface="Roboto Medium" panose="02000000000000000000" pitchFamily="2" charset="0"/>
-            </a:endParaRPr>
-          </a:p>
-        </p:txBody>
-      </p:sp>
-      <p:sp>
-        <p:nvSpPr>
-          <p:cNvPr id="22" name="Rechteck 21">
-            <a:extLst>
-              <a:ext uri="{FF2B5EF4-FFF2-40B4-BE49-F238E27FC236}">
-                <a16:creationId xmlns:a16="http://schemas.microsoft.com/office/drawing/2014/main" id="{31A45673-A05A-4F32-ABDA-7EED3F5AC1A4}"/>
-              </a:ext>
-            </a:extLst>
-          </p:cNvPr>
-          <p:cNvSpPr/>
-          <p:nvPr/>
-        </p:nvSpPr>
-        <p:spPr>
-          <a:xfrm>
-            <a:off x="3555050" y="3948982"/>
-            <a:ext cx="1212742" cy="716970"/>
-          </a:xfrm>
-          <a:prstGeom prst="rect">
-            <a:avLst/>
-          </a:prstGeom>
-        </p:spPr>
-        <p:style>
-          <a:lnRef idx="2">
-            <a:schemeClr val="accent6">
-              <a:shade val="50000"/>
-            </a:schemeClr>
-          </a:lnRef>
-          <a:fillRef idx="1">
-            <a:schemeClr val="accent6"/>
-          </a:fillRef>
-          <a:effectRef idx="0">
-            <a:schemeClr val="accent6"/>
-          </a:effectRef>
-          <a:fontRef idx="minor">
-            <a:schemeClr val="lt1"/>
-          </a:fontRef>
-        </p:style>
-        <p:txBody>
-          <a:bodyPr rtlCol="0" anchor="ctr"/>
-          <a:lstStyle/>
-          <a:p>
-            <a:pPr algn="ctr"/>
-            <a:r>
-              <a:rPr lang="de-DE" sz="1400" err="1">
-                <a:latin typeface="Roboto Medium" panose="02000000000000000000" pitchFamily="2" charset="0"/>
-                <a:ea typeface="Roboto Medium" panose="02000000000000000000" pitchFamily="2" charset="0"/>
-              </a:rPr>
-              <a:t>StoreService</a:t>
-            </a:r>
-            <a:endParaRPr lang="de-DE" sz="1400">
-              <a:latin typeface="Roboto Medium" panose="02000000000000000000" pitchFamily="2" charset="0"/>
-              <a:ea typeface="Roboto Medium" panose="02000000000000000000" pitchFamily="2" charset="0"/>
-            </a:endParaRPr>
-          </a:p>
-        </p:txBody>
-      </p:sp>
-      <p:sp>
-        <p:nvSpPr>
-          <p:cNvPr id="67" name="Rechteck 66">
-            <a:extLst>
-              <a:ext uri="{FF2B5EF4-FFF2-40B4-BE49-F238E27FC236}">
-                <a16:creationId xmlns:a16="http://schemas.microsoft.com/office/drawing/2014/main" id="{1D7A00AE-CB40-437A-9A88-11C904B2A2DE}"/>
-              </a:ext>
-            </a:extLst>
-          </p:cNvPr>
-          <p:cNvSpPr/>
-          <p:nvPr/>
-        </p:nvSpPr>
-        <p:spPr>
-          <a:xfrm>
-            <a:off x="2176193" y="5444415"/>
-            <a:ext cx="1212742" cy="716970"/>
-          </a:xfrm>
-          <a:prstGeom prst="rect">
-            <a:avLst/>
-          </a:prstGeom>
-        </p:spPr>
-        <p:style>
-          <a:lnRef idx="2">
-            <a:schemeClr val="accent3">
-              <a:shade val="50000"/>
-            </a:schemeClr>
-          </a:lnRef>
-          <a:fillRef idx="1">
-            <a:schemeClr val="accent3"/>
-          </a:fillRef>
-          <a:effectRef idx="0">
-            <a:schemeClr val="accent3"/>
-          </a:effectRef>
-          <a:fontRef idx="minor">
-            <a:schemeClr val="lt1"/>
-          </a:fontRef>
-        </p:style>
-        <p:txBody>
-          <a:bodyPr rtlCol="0" anchor="ctr"/>
-          <a:lstStyle/>
-          <a:p>
-            <a:pPr algn="ctr"/>
-            <a:r>
               <a:rPr lang="de-DE" sz="1400">
                 <a:latin typeface="Roboto Medium" panose="02000000000000000000" pitchFamily="2" charset="0"/>
                 <a:ea typeface="Roboto Medium" panose="02000000000000000000" pitchFamily="2" charset="0"/>
               </a:rPr>
-              <a:t>DBManager</a:t>
+              <a:t>Message Manager</a:t>
             </a:r>
           </a:p>
         </p:txBody>
       </p:sp>
       <p:cxnSp>
         <p:nvCxnSpPr>
-          <p:cNvPr id="71" name="Verbinder: gewinkelt 70">
-            <a:extLst>
-              <a:ext uri="{FF2B5EF4-FFF2-40B4-BE49-F238E27FC236}">
-                <a16:creationId xmlns:a16="http://schemas.microsoft.com/office/drawing/2014/main" id="{238E2458-EBDA-4860-8281-03FB6D10CF1E}"/>
+          <p:cNvPr id="86" name="Verbinder: gewinkelt 85">
+            <a:extLst>
+              <a:ext uri="{FF2B5EF4-FFF2-40B4-BE49-F238E27FC236}">
+                <a16:creationId xmlns:a16="http://schemas.microsoft.com/office/drawing/2014/main" id="{268CE183-4711-449A-B58A-E678F94E5B8F}"/>
               </a:ext>
             </a:extLst>
           </p:cNvPr>
           <p:cNvCxnSpPr>
             <a:cxnSpLocks/>
-            <a:stCxn id="22" idx="2"/>
-            <a:endCxn id="67" idx="3"/>
+            <a:stCxn id="80" idx="0"/>
+            <a:endCxn id="13" idx="1"/>
           </p:cNvCxnSpPr>
           <p:nvPr/>
         </p:nvCxnSpPr>
         <p:spPr>
-          <a:xfrm rot="5400000">
-            <a:off x="3206704" y="4848183"/>
-            <a:ext cx="1136948" cy="772486"/>
-          </a:xfrm>
-          <a:prstGeom prst="bentConnector2">
-            <a:avLst/>
+          <a:xfrm flipV="1">
+            <a:off x="1168233" y="815526"/>
+            <a:ext cx="2133232" cy="1988523"/>
+          </a:xfrm>
+          <a:prstGeom prst="bentConnector3">
+            <a:avLst>
+              <a:gd name="adj1" fmla="val -1909"/>
+            </a:avLst>
           </a:prstGeom>
           <a:ln w="57150">
-            <a:solidFill>
-              <a:srgbClr val="00B0F0"/>
-            </a:solidFill>
             <a:tailEnd type="triangle"/>
           </a:ln>
         </p:spPr>
         <p:style>
           <a:lnRef idx="1">
-            <a:schemeClr val="accent1"/>
+            <a:schemeClr val="accent4"/>
           </a:lnRef>
           <a:fillRef idx="0">
-            <a:schemeClr val="accent1"/>
+            <a:schemeClr val="accent4"/>
           </a:fillRef>
           <a:effectRef idx="0">
-            <a:schemeClr val="accent1"/>
+            <a:schemeClr val="accent4"/>
           </a:effectRef>
           <a:fontRef idx="minor">
             <a:schemeClr val="tx1"/>
@@ -11949,10 +11838,67 @@
       </p:cxnSp>
       <p:sp>
         <p:nvSpPr>
-          <p:cNvPr id="79" name="Gleichschenkliges Dreieck 78">
-            <a:extLst>
-              <a:ext uri="{FF2B5EF4-FFF2-40B4-BE49-F238E27FC236}">
-                <a16:creationId xmlns:a16="http://schemas.microsoft.com/office/drawing/2014/main" id="{9A26699E-BF04-49E7-808C-8B5AED3524D7}"/>
+          <p:cNvPr id="87" name="Textfeld 86">
+            <a:extLst>
+              <a:ext uri="{FF2B5EF4-FFF2-40B4-BE49-F238E27FC236}">
+                <a16:creationId xmlns:a16="http://schemas.microsoft.com/office/drawing/2014/main" id="{FED30CBC-3B5C-461C-A6D0-4BAB7FB279BD}"/>
+              </a:ext>
+            </a:extLst>
+          </p:cNvPr>
+          <p:cNvSpPr txBox="1"/>
+          <p:nvPr/>
+        </p:nvSpPr>
+        <p:spPr>
+          <a:xfrm>
+            <a:off x="2560320" y="4875940"/>
+            <a:ext cx="1825449" cy="523220"/>
+          </a:xfrm>
+          <a:prstGeom prst="rect">
+            <a:avLst/>
+          </a:prstGeom>
+          <a:noFill/>
+        </p:spPr>
+        <p:txBody>
+          <a:bodyPr wrap="square" rtlCol="0" anchor="ctr">
+            <a:spAutoFit/>
+          </a:bodyPr>
+          <a:lstStyle/>
+          <a:p>
+            <a:pPr algn="ctr"/>
+            <a:r>
+              <a:rPr lang="de-DE" sz="2800">
+                <a:effectLst>
+                  <a:outerShdw blurRad="38100" dist="38100" dir="2700000" algn="tl">
+                    <a:srgbClr val="000000">
+                      <a:alpha val="43137"/>
+                    </a:srgbClr>
+                  </a:outerShdw>
+                </a:effectLst>
+                <a:latin typeface="Roboto Medium" panose="02000000000000000000" pitchFamily="2" charset="0"/>
+                <a:ea typeface="Roboto Medium" panose="02000000000000000000" pitchFamily="2" charset="0"/>
+              </a:rPr>
+              <a:t>SQLite</a:t>
+            </a:r>
+            <a:endParaRPr lang="de-DE">
+              <a:effectLst>
+                <a:outerShdw blurRad="38100" dist="38100" dir="2700000" algn="tl">
+                  <a:srgbClr val="000000">
+                    <a:alpha val="43137"/>
+                  </a:srgbClr>
+                </a:outerShdw>
+              </a:effectLst>
+              <a:latin typeface="Roboto Medium" panose="02000000000000000000" pitchFamily="2" charset="0"/>
+              <a:ea typeface="Roboto Medium" panose="02000000000000000000" pitchFamily="2" charset="0"/>
+            </a:endParaRPr>
+          </a:p>
+        </p:txBody>
+      </p:sp>
+      <p:sp>
+        <p:nvSpPr>
+          <p:cNvPr id="89" name="Rechteck 88">
+            <a:extLst>
+              <a:ext uri="{FF2B5EF4-FFF2-40B4-BE49-F238E27FC236}">
+                <a16:creationId xmlns:a16="http://schemas.microsoft.com/office/drawing/2014/main" id="{7F7FFD16-04A6-43C8-85C0-BEFD58C592F0}"/>
               </a:ext>
             </a:extLst>
           </p:cNvPr>
@@ -11960,11 +11906,131 @@
           <p:nvPr/>
         </p:nvSpPr>
         <p:spPr>
-          <a:xfrm rot="16200000">
-            <a:off x="-227056" y="3498927"/>
-            <a:ext cx="1853920" cy="869546"/>
-          </a:xfrm>
-          <a:prstGeom prst="triangle">
+          <a:xfrm>
+            <a:off x="998590" y="6295610"/>
+            <a:ext cx="3710132" cy="390340"/>
+          </a:xfrm>
+          <a:prstGeom prst="rect">
+            <a:avLst/>
+          </a:prstGeom>
+          <a:noFill/>
+          <a:ln w="9525" cap="flat" cmpd="sng" algn="ctr">
+            <a:solidFill>
+              <a:schemeClr val="accent1"/>
+            </a:solidFill>
+            <a:prstDash val="solid"/>
+            <a:round/>
+            <a:headEnd type="none" w="med" len="med"/>
+            <a:tailEnd type="none" w="med" len="med"/>
+          </a:ln>
+        </p:spPr>
+        <p:style>
+          <a:lnRef idx="0">
+            <a:scrgbClr r="0" g="0" b="0"/>
+          </a:lnRef>
+          <a:fillRef idx="0">
+            <a:scrgbClr r="0" g="0" b="0"/>
+          </a:fillRef>
+          <a:effectRef idx="0">
+            <a:scrgbClr r="0" g="0" b="0"/>
+          </a:effectRef>
+          <a:fontRef idx="minor">
+            <a:schemeClr val="accent1"/>
+          </a:fontRef>
+        </p:style>
+        <p:txBody>
+          <a:bodyPr rtlCol="0" anchor="ctr"/>
+          <a:lstStyle/>
+          <a:p>
+            <a:pPr algn="ctr"/>
+            <a:r>
+              <a:rPr lang="de-DE">
+                <a:latin typeface="Roboto Medium" panose="02000000000000000000" pitchFamily="2" charset="0"/>
+                <a:ea typeface="Roboto Medium" panose="02000000000000000000" pitchFamily="2" charset="0"/>
+              </a:rPr>
+              <a:t>Client: Message Transfer (old)</a:t>
+            </a:r>
+          </a:p>
+        </p:txBody>
+      </p:sp>
+      <p:sp>
+        <p:nvSpPr>
+          <p:cNvPr id="90" name="Rechteck 89">
+            <a:extLst>
+              <a:ext uri="{FF2B5EF4-FFF2-40B4-BE49-F238E27FC236}">
+                <a16:creationId xmlns:a16="http://schemas.microsoft.com/office/drawing/2014/main" id="{5C76AC69-6AE8-4A5E-9B49-807910830E84}"/>
+              </a:ext>
+            </a:extLst>
+          </p:cNvPr>
+          <p:cNvSpPr/>
+          <p:nvPr/>
+        </p:nvSpPr>
+        <p:spPr>
+          <a:xfrm>
+            <a:off x="7942810" y="6295610"/>
+            <a:ext cx="3453503" cy="390340"/>
+          </a:xfrm>
+          <a:prstGeom prst="rect">
+            <a:avLst/>
+          </a:prstGeom>
+          <a:noFill/>
+          <a:ln w="9525" cap="flat" cmpd="sng" algn="ctr">
+            <a:solidFill>
+              <a:schemeClr val="accent1"/>
+            </a:solidFill>
+            <a:prstDash val="solid"/>
+            <a:round/>
+            <a:headEnd type="none" w="med" len="med"/>
+            <a:tailEnd type="none" w="med" len="med"/>
+          </a:ln>
+        </p:spPr>
+        <p:style>
+          <a:lnRef idx="0">
+            <a:scrgbClr r="0" g="0" b="0"/>
+          </a:lnRef>
+          <a:fillRef idx="0">
+            <a:scrgbClr r="0" g="0" b="0"/>
+          </a:fillRef>
+          <a:effectRef idx="0">
+            <a:scrgbClr r="0" g="0" b="0"/>
+          </a:effectRef>
+          <a:fontRef idx="minor">
+            <a:schemeClr val="accent1"/>
+          </a:fontRef>
+        </p:style>
+        <p:txBody>
+          <a:bodyPr rtlCol="0" anchor="ctr"/>
+          <a:lstStyle/>
+          <a:p>
+            <a:pPr algn="ctr"/>
+            <a:r>
+              <a:rPr lang="de-DE">
+                <a:latin typeface="Roboto Medium" panose="02000000000000000000" pitchFamily="2" charset="0"/>
+                <a:ea typeface="Roboto Medium" panose="02000000000000000000" pitchFamily="2" charset="0"/>
+              </a:rPr>
+              <a:t>Server: Message Transfer (old)</a:t>
+            </a:r>
+          </a:p>
+        </p:txBody>
+      </p:sp>
+      <p:sp>
+        <p:nvSpPr>
+          <p:cNvPr id="17" name="Rechteck 16">
+            <a:extLst>
+              <a:ext uri="{FF2B5EF4-FFF2-40B4-BE49-F238E27FC236}">
+                <a16:creationId xmlns:a16="http://schemas.microsoft.com/office/drawing/2014/main" id="{7F0CDD3D-DC75-44EA-B18F-A3B6D7F55631}"/>
+              </a:ext>
+            </a:extLst>
+          </p:cNvPr>
+          <p:cNvSpPr/>
+          <p:nvPr/>
+        </p:nvSpPr>
+        <p:spPr>
+          <a:xfrm>
+            <a:off x="10064751" y="1391669"/>
+            <a:ext cx="1212742" cy="716970"/>
+          </a:xfrm>
+          <a:prstGeom prst="rect">
             <a:avLst/>
           </a:prstGeom>
         </p:spPr>
@@ -11994,51 +12060,9 @@
                 <a:latin typeface="Roboto Medium" panose="02000000000000000000" pitchFamily="2" charset="0"/>
                 <a:ea typeface="Roboto Medium" panose="02000000000000000000" pitchFamily="2" charset="0"/>
               </a:rPr>
-              <a:t>Message List</a:t>
-            </a:r>
-          </a:p>
-        </p:txBody>
-      </p:sp>
-      <p:sp>
-        <p:nvSpPr>
-          <p:cNvPr id="80" name="Gleichschenkliges Dreieck 79">
-            <a:extLst>
-              <a:ext uri="{FF2B5EF4-FFF2-40B4-BE49-F238E27FC236}">
-                <a16:creationId xmlns:a16="http://schemas.microsoft.com/office/drawing/2014/main" id="{AA488369-24D7-4D98-8C9A-0AB281F4F80D}"/>
-              </a:ext>
-            </a:extLst>
-          </p:cNvPr>
-          <p:cNvSpPr/>
-          <p:nvPr/>
-        </p:nvSpPr>
-        <p:spPr>
-          <a:xfrm rot="5400000">
-            <a:off x="-193499" y="932666"/>
-            <a:ext cx="1853918" cy="869546"/>
-          </a:xfrm>
-          <a:prstGeom prst="triangle">
-            <a:avLst/>
-          </a:prstGeom>
-        </p:spPr>
-        <p:style>
-          <a:lnRef idx="2">
-            <a:schemeClr val="accent2">
-              <a:shade val="50000"/>
-            </a:schemeClr>
-          </a:lnRef>
-          <a:fillRef idx="1">
-            <a:schemeClr val="accent2"/>
-          </a:fillRef>
-          <a:effectRef idx="0">
-            <a:schemeClr val="accent2"/>
-          </a:effectRef>
-          <a:fontRef idx="minor">
-            <a:schemeClr val="lt1"/>
-          </a:fontRef>
-        </p:style>
-        <p:txBody>
-          <a:bodyPr rtlCol="0" anchor="ctr"/>
-          <a:lstStyle/>
+              <a:t>Message</a:t>
+            </a:r>
+          </a:p>
           <a:p>
             <a:pPr algn="ctr"/>
             <a:r>
@@ -12046,294 +12070,8 @@
                 <a:latin typeface="Roboto Medium" panose="02000000000000000000" pitchFamily="2" charset="0"/>
                 <a:ea typeface="Roboto Medium" panose="02000000000000000000" pitchFamily="2" charset="0"/>
               </a:rPr>
-              <a:t>Send</a:t>
-            </a:r>
-          </a:p>
-          <a:p>
-            <a:pPr algn="ctr"/>
-            <a:r>
-              <a:rPr lang="de-DE" sz="1400">
-                <a:latin typeface="Roboto Medium" panose="02000000000000000000" pitchFamily="2" charset="0"/>
-                <a:ea typeface="Roboto Medium" panose="02000000000000000000" pitchFamily="2" charset="0"/>
-              </a:rPr>
-              <a:t>Queue</a:t>
-            </a:r>
-          </a:p>
-        </p:txBody>
-      </p:sp>
-      <p:cxnSp>
-        <p:nvCxnSpPr>
-          <p:cNvPr id="86" name="Verbinder: gewinkelt 85">
-            <a:extLst>
-              <a:ext uri="{FF2B5EF4-FFF2-40B4-BE49-F238E27FC236}">
-                <a16:creationId xmlns:a16="http://schemas.microsoft.com/office/drawing/2014/main" id="{268CE183-4711-449A-B58A-E678F94E5B8F}"/>
-              </a:ext>
-            </a:extLst>
-          </p:cNvPr>
-          <p:cNvCxnSpPr>
-            <a:cxnSpLocks/>
-            <a:stCxn id="80" idx="0"/>
-            <a:endCxn id="13" idx="1"/>
-          </p:cNvCxnSpPr>
-          <p:nvPr/>
-        </p:nvCxnSpPr>
-        <p:spPr>
-          <a:xfrm flipV="1">
-            <a:off x="1168233" y="815526"/>
-            <a:ext cx="2133232" cy="551913"/>
-          </a:xfrm>
-          <a:prstGeom prst="bentConnector3">
-            <a:avLst/>
-          </a:prstGeom>
-          <a:ln w="57150">
-            <a:tailEnd type="triangle"/>
-          </a:ln>
-        </p:spPr>
-        <p:style>
-          <a:lnRef idx="1">
-            <a:schemeClr val="accent4"/>
-          </a:lnRef>
-          <a:fillRef idx="0">
-            <a:schemeClr val="accent4"/>
-          </a:fillRef>
-          <a:effectRef idx="0">
-            <a:schemeClr val="accent4"/>
-          </a:effectRef>
-          <a:fontRef idx="minor">
-            <a:schemeClr val="tx1"/>
-          </a:fontRef>
-        </p:style>
-      </p:cxnSp>
-      <p:sp>
-        <p:nvSpPr>
-          <p:cNvPr id="87" name="Textfeld 86">
-            <a:extLst>
-              <a:ext uri="{FF2B5EF4-FFF2-40B4-BE49-F238E27FC236}">
-                <a16:creationId xmlns:a16="http://schemas.microsoft.com/office/drawing/2014/main" id="{FED30CBC-3B5C-461C-A6D0-4BAB7FB279BD}"/>
-              </a:ext>
-            </a:extLst>
-          </p:cNvPr>
-          <p:cNvSpPr txBox="1"/>
-          <p:nvPr/>
-        </p:nvSpPr>
-        <p:spPr>
-          <a:xfrm>
-            <a:off x="2560320" y="4875940"/>
-            <a:ext cx="1825449" cy="523220"/>
-          </a:xfrm>
-          <a:prstGeom prst="rect">
-            <a:avLst/>
-          </a:prstGeom>
-          <a:noFill/>
-        </p:spPr>
-        <p:txBody>
-          <a:bodyPr wrap="square" rtlCol="0" anchor="ctr">
-            <a:spAutoFit/>
-          </a:bodyPr>
-          <a:lstStyle/>
-          <a:p>
-            <a:pPr algn="ctr"/>
-            <a:r>
-              <a:rPr lang="de-DE" sz="2800">
-                <a:effectLst>
-                  <a:outerShdw blurRad="38100" dist="38100" dir="2700000" algn="tl">
-                    <a:srgbClr val="000000">
-                      <a:alpha val="43137"/>
-                    </a:srgbClr>
-                  </a:outerShdw>
-                </a:effectLst>
-                <a:latin typeface="Roboto Medium" panose="02000000000000000000" pitchFamily="2" charset="0"/>
-                <a:ea typeface="Roboto Medium" panose="02000000000000000000" pitchFamily="2" charset="0"/>
-              </a:rPr>
-              <a:t>SQLite</a:t>
-            </a:r>
-            <a:endParaRPr lang="de-DE">
-              <a:effectLst>
-                <a:outerShdw blurRad="38100" dist="38100" dir="2700000" algn="tl">
-                  <a:srgbClr val="000000">
-                    <a:alpha val="43137"/>
-                  </a:srgbClr>
-                </a:outerShdw>
-              </a:effectLst>
-              <a:latin typeface="Roboto Medium" panose="02000000000000000000" pitchFamily="2" charset="0"/>
-              <a:ea typeface="Roboto Medium" panose="02000000000000000000" pitchFamily="2" charset="0"/>
-            </a:endParaRPr>
-          </a:p>
-        </p:txBody>
-      </p:sp>
-      <p:sp>
-        <p:nvSpPr>
-          <p:cNvPr id="89" name="Rechteck 88">
-            <a:extLst>
-              <a:ext uri="{FF2B5EF4-FFF2-40B4-BE49-F238E27FC236}">
-                <a16:creationId xmlns:a16="http://schemas.microsoft.com/office/drawing/2014/main" id="{7F7FFD16-04A6-43C8-85C0-BEFD58C592F0}"/>
-              </a:ext>
-            </a:extLst>
-          </p:cNvPr>
-          <p:cNvSpPr/>
-          <p:nvPr/>
-        </p:nvSpPr>
-        <p:spPr>
-          <a:xfrm>
-            <a:off x="998590" y="6295610"/>
-            <a:ext cx="3710132" cy="390340"/>
-          </a:xfrm>
-          <a:prstGeom prst="rect">
-            <a:avLst/>
-          </a:prstGeom>
-          <a:noFill/>
-          <a:ln w="9525" cap="flat" cmpd="sng" algn="ctr">
-            <a:solidFill>
-              <a:schemeClr val="accent1"/>
-            </a:solidFill>
-            <a:prstDash val="solid"/>
-            <a:round/>
-            <a:headEnd type="none" w="med" len="med"/>
-            <a:tailEnd type="none" w="med" len="med"/>
-          </a:ln>
-        </p:spPr>
-        <p:style>
-          <a:lnRef idx="0">
-            <a:scrgbClr r="0" g="0" b="0"/>
-          </a:lnRef>
-          <a:fillRef idx="0">
-            <a:scrgbClr r="0" g="0" b="0"/>
-          </a:fillRef>
-          <a:effectRef idx="0">
-            <a:scrgbClr r="0" g="0" b="0"/>
-          </a:effectRef>
-          <a:fontRef idx="minor">
-            <a:schemeClr val="accent1"/>
-          </a:fontRef>
-        </p:style>
-        <p:txBody>
-          <a:bodyPr rtlCol="0" anchor="ctr"/>
-          <a:lstStyle/>
-          <a:p>
-            <a:pPr algn="ctr"/>
-            <a:r>
-              <a:rPr lang="de-DE">
-                <a:latin typeface="Roboto Medium" panose="02000000000000000000" pitchFamily="2" charset="0"/>
-                <a:ea typeface="Roboto Medium" panose="02000000000000000000" pitchFamily="2" charset="0"/>
-              </a:rPr>
-              <a:t>Client: Message Transfer (old)</a:t>
-            </a:r>
-          </a:p>
-        </p:txBody>
-      </p:sp>
-      <p:sp>
-        <p:nvSpPr>
-          <p:cNvPr id="90" name="Rechteck 89">
-            <a:extLst>
-              <a:ext uri="{FF2B5EF4-FFF2-40B4-BE49-F238E27FC236}">
-                <a16:creationId xmlns:a16="http://schemas.microsoft.com/office/drawing/2014/main" id="{5C76AC69-6AE8-4A5E-9B49-807910830E84}"/>
-              </a:ext>
-            </a:extLst>
-          </p:cNvPr>
-          <p:cNvSpPr/>
-          <p:nvPr/>
-        </p:nvSpPr>
-        <p:spPr>
-          <a:xfrm>
-            <a:off x="7942810" y="6295610"/>
-            <a:ext cx="3453503" cy="390340"/>
-          </a:xfrm>
-          <a:prstGeom prst="rect">
-            <a:avLst/>
-          </a:prstGeom>
-          <a:noFill/>
-          <a:ln w="9525" cap="flat" cmpd="sng" algn="ctr">
-            <a:solidFill>
-              <a:schemeClr val="accent1"/>
-            </a:solidFill>
-            <a:prstDash val="solid"/>
-            <a:round/>
-            <a:headEnd type="none" w="med" len="med"/>
-            <a:tailEnd type="none" w="med" len="med"/>
-          </a:ln>
-        </p:spPr>
-        <p:style>
-          <a:lnRef idx="0">
-            <a:scrgbClr r="0" g="0" b="0"/>
-          </a:lnRef>
-          <a:fillRef idx="0">
-            <a:scrgbClr r="0" g="0" b="0"/>
-          </a:fillRef>
-          <a:effectRef idx="0">
-            <a:scrgbClr r="0" g="0" b="0"/>
-          </a:effectRef>
-          <a:fontRef idx="minor">
-            <a:schemeClr val="accent1"/>
-          </a:fontRef>
-        </p:style>
-        <p:txBody>
-          <a:bodyPr rtlCol="0" anchor="ctr"/>
-          <a:lstStyle/>
-          <a:p>
-            <a:pPr algn="ctr"/>
-            <a:r>
-              <a:rPr lang="de-DE">
-                <a:latin typeface="Roboto Medium" panose="02000000000000000000" pitchFamily="2" charset="0"/>
-                <a:ea typeface="Roboto Medium" panose="02000000000000000000" pitchFamily="2" charset="0"/>
-              </a:rPr>
-              <a:t>Server: Message Transfer (old)</a:t>
-            </a:r>
-          </a:p>
-        </p:txBody>
-      </p:sp>
-      <p:sp>
-        <p:nvSpPr>
-          <p:cNvPr id="17" name="Rechteck 16">
-            <a:extLst>
-              <a:ext uri="{FF2B5EF4-FFF2-40B4-BE49-F238E27FC236}">
-                <a16:creationId xmlns:a16="http://schemas.microsoft.com/office/drawing/2014/main" id="{7F0CDD3D-DC75-44EA-B18F-A3B6D7F55631}"/>
-              </a:ext>
-            </a:extLst>
-          </p:cNvPr>
-          <p:cNvSpPr/>
-          <p:nvPr/>
-        </p:nvSpPr>
-        <p:spPr>
-          <a:xfrm>
-            <a:off x="10064751" y="1391669"/>
-            <a:ext cx="1212742" cy="716970"/>
-          </a:xfrm>
-          <a:prstGeom prst="rect">
-            <a:avLst/>
-          </a:prstGeom>
-        </p:spPr>
-        <p:style>
-          <a:lnRef idx="2">
-            <a:schemeClr val="accent2">
-              <a:shade val="50000"/>
-            </a:schemeClr>
-          </a:lnRef>
-          <a:fillRef idx="1">
-            <a:schemeClr val="accent2"/>
-          </a:fillRef>
-          <a:effectRef idx="0">
-            <a:schemeClr val="accent2"/>
-          </a:effectRef>
-          <a:fontRef idx="minor">
-            <a:schemeClr val="lt1"/>
-          </a:fontRef>
-        </p:style>
-        <p:txBody>
-          <a:bodyPr rtlCol="0" anchor="ctr"/>
-          <a:lstStyle/>
-          <a:p>
-            <a:pPr algn="ctr"/>
-            <a:r>
-              <a:rPr lang="de-DE" sz="1400" err="1">
-                <a:latin typeface="Roboto Medium" panose="02000000000000000000" pitchFamily="2" charset="0"/>
-                <a:ea typeface="Roboto Medium" panose="02000000000000000000" pitchFamily="2" charset="0"/>
-              </a:rPr>
-              <a:t>SendQueue</a:t>
-            </a:r>
-            <a:endParaRPr lang="de-DE" sz="1400">
-              <a:latin typeface="Roboto Medium" panose="02000000000000000000" pitchFamily="2" charset="0"/>
-              <a:ea typeface="Roboto Medium" panose="02000000000000000000" pitchFamily="2" charset="0"/>
-            </a:endParaRPr>
+              <a:t>Manager</a:t>
+            </a:r>
           </a:p>
         </p:txBody>
       </p:sp>
@@ -12348,24 +12086,24 @@
           </p:cNvPr>
           <p:cNvCxnSpPr>
             <a:cxnSpLocks/>
-            <a:stCxn id="42" idx="1"/>
-            <a:endCxn id="79" idx="3"/>
+            <a:stCxn id="67" idx="0"/>
+            <a:endCxn id="80" idx="5"/>
           </p:cNvCxnSpPr>
           <p:nvPr/>
         </p:nvCxnSpPr>
         <p:spPr>
-          <a:xfrm rot="10800000">
-            <a:off x="1134677" y="3933701"/>
-            <a:ext cx="968204" cy="373767"/>
+          <a:xfrm rot="16200000" flipV="1">
+            <a:off x="1028722" y="3690573"/>
+            <a:ext cx="1458581" cy="2049104"/>
           </a:xfrm>
           <a:prstGeom prst="bentConnector3">
             <a:avLst>
-              <a:gd name="adj1" fmla="val 50000"/>
+              <a:gd name="adj1" fmla="val 16066"/>
             </a:avLst>
           </a:prstGeom>
           <a:ln w="57150">
             <a:solidFill>
-              <a:srgbClr val="00B0F0"/>
+              <a:srgbClr val="FFC000"/>
             </a:solidFill>
             <a:tailEnd type="triangle"/>
           </a:ln>
@@ -12396,67 +12134,21 @@
           </p:cNvPr>
           <p:cNvCxnSpPr>
             <a:cxnSpLocks/>
-            <a:stCxn id="21" idx="2"/>
-            <a:endCxn id="22" idx="0"/>
+            <a:stCxn id="80" idx="0"/>
+            <a:endCxn id="22" idx="1"/>
           </p:cNvCxnSpPr>
           <p:nvPr/>
         </p:nvCxnSpPr>
         <p:spPr>
-          <a:xfrm rot="16200000" flipH="1">
-            <a:off x="3345345" y="3132906"/>
-            <a:ext cx="606814" cy="1025337"/>
-          </a:xfrm>
-          <a:prstGeom prst="bentConnector3">
+          <a:xfrm>
+            <a:off x="1168233" y="2804049"/>
+            <a:ext cx="934648" cy="1087838"/>
+          </a:xfrm>
+          <a:prstGeom prst="bentConnector5">
             <a:avLst>
-              <a:gd name="adj1" fmla="val 50000"/>
-            </a:avLst>
-          </a:prstGeom>
-          <a:ln w="57150">
-            <a:solidFill>
-              <a:srgbClr val="FFC000"/>
-            </a:solidFill>
-            <a:tailEnd type="triangle"/>
-          </a:ln>
-        </p:spPr>
-        <p:style>
-          <a:lnRef idx="1">
-            <a:schemeClr val="accent1"/>
-          </a:lnRef>
-          <a:fillRef idx="0">
-            <a:schemeClr val="accent1"/>
-          </a:fillRef>
-          <a:effectRef idx="0">
-            <a:schemeClr val="accent1"/>
-          </a:effectRef>
-          <a:fontRef idx="minor">
-            <a:schemeClr val="tx1"/>
-          </a:fontRef>
-        </p:style>
-      </p:cxnSp>
-      <p:cxnSp>
-        <p:nvCxnSpPr>
-          <p:cNvPr id="49" name="Verbinder: gewinkelt 48">
-            <a:extLst>
-              <a:ext uri="{FF2B5EF4-FFF2-40B4-BE49-F238E27FC236}">
-                <a16:creationId xmlns:a16="http://schemas.microsoft.com/office/drawing/2014/main" id="{2FC944CD-80E4-4BFE-98A5-1D44E11D7C7F}"/>
-              </a:ext>
-            </a:extLst>
-          </p:cNvPr>
-          <p:cNvCxnSpPr>
-            <a:cxnSpLocks/>
-            <a:stCxn id="67" idx="0"/>
-            <a:endCxn id="42" idx="2"/>
-          </p:cNvCxnSpPr>
-          <p:nvPr/>
-        </p:nvCxnSpPr>
-        <p:spPr>
-          <a:xfrm rot="16200000" flipV="1">
-            <a:off x="2387807" y="5049658"/>
-            <a:ext cx="778463" cy="11052"/>
-          </a:xfrm>
-          <a:prstGeom prst="bentConnector3">
-            <a:avLst>
-              <a:gd name="adj1" fmla="val 50000"/>
+              <a:gd name="adj1" fmla="val 24458"/>
+              <a:gd name="adj2" fmla="val 100402"/>
+              <a:gd name="adj3" fmla="val 75542"/>
             </a:avLst>
           </a:prstGeom>
           <a:ln w="57150">
@@ -12576,7 +12268,7 @@
                 <a:latin typeface="Roboto Medium" panose="02000000000000000000" pitchFamily="2" charset="0"/>
                 <a:ea typeface="Roboto Medium" panose="02000000000000000000" pitchFamily="2" charset="0"/>
               </a:rPr>
-              <a:t>Datenbank</a:t>
+              <a:t>Database</a:t>
             </a:r>
           </a:p>
         </p:txBody>
@@ -12629,10 +12321,10 @@
       </p:cxnSp>
       <p:sp>
         <p:nvSpPr>
-          <p:cNvPr id="85" name="Textfeld 84">
-            <a:extLst>
-              <a:ext uri="{FF2B5EF4-FFF2-40B4-BE49-F238E27FC236}">
-                <a16:creationId xmlns:a16="http://schemas.microsoft.com/office/drawing/2014/main" id="{53F8C80B-6849-46DF-9D8E-0A2054CCA22C}"/>
+          <p:cNvPr id="91" name="Textfeld 90">
+            <a:extLst>
+              <a:ext uri="{FF2B5EF4-FFF2-40B4-BE49-F238E27FC236}">
+                <a16:creationId xmlns:a16="http://schemas.microsoft.com/office/drawing/2014/main" id="{FB8F3D7B-3EEC-41E0-A10E-3A07D3341F5C}"/>
               </a:ext>
             </a:extLst>
           </p:cNvPr>
@@ -12641,8 +12333,8 @@
         </p:nvSpPr>
         <p:spPr>
           <a:xfrm>
-            <a:off x="-7425" y="800245"/>
-            <a:ext cx="3078489" cy="338554"/>
+            <a:off x="8317817" y="2193262"/>
+            <a:ext cx="3078489" cy="584775"/>
           </a:xfrm>
           <a:prstGeom prst="rect">
             <a:avLst/>
@@ -12681,159 +12373,7 @@
                 <a:latin typeface="Roboto Medium" panose="02000000000000000000" pitchFamily="2" charset="0"/>
                 <a:ea typeface="Roboto Medium" panose="02000000000000000000" pitchFamily="2" charset="0"/>
               </a:rPr>
-              <a:t>Poll Message</a:t>
-            </a:r>
-            <a:endParaRPr lang="de-DE">
-              <a:solidFill>
-                <a:schemeClr val="tx1">
-                  <a:lumMod val="95000"/>
-                  <a:lumOff val="5000"/>
-                </a:schemeClr>
-              </a:solidFill>
-              <a:effectLst>
-                <a:outerShdw blurRad="38100" dist="38100" dir="2700000" algn="tl">
-                  <a:srgbClr val="000000">
-                    <a:alpha val="43137"/>
-                  </a:srgbClr>
-                </a:outerShdw>
-              </a:effectLst>
-              <a:latin typeface="Roboto Medium" panose="02000000000000000000" pitchFamily="2" charset="0"/>
-              <a:ea typeface="Roboto Medium" panose="02000000000000000000" pitchFamily="2" charset="0"/>
-            </a:endParaRPr>
-          </a:p>
-        </p:txBody>
-      </p:sp>
-      <p:sp>
-        <p:nvSpPr>
-          <p:cNvPr id="88" name="Textfeld 87">
-            <a:extLst>
-              <a:ext uri="{FF2B5EF4-FFF2-40B4-BE49-F238E27FC236}">
-                <a16:creationId xmlns:a16="http://schemas.microsoft.com/office/drawing/2014/main" id="{A35D1D7C-38D4-43B3-ACB8-936D11F238B6}"/>
-              </a:ext>
-            </a:extLst>
-          </p:cNvPr>
-          <p:cNvSpPr txBox="1"/>
-          <p:nvPr/>
-        </p:nvSpPr>
-        <p:spPr>
-          <a:xfrm>
-            <a:off x="2853656" y="3226200"/>
-            <a:ext cx="3078489" cy="338554"/>
-          </a:xfrm>
-          <a:prstGeom prst="rect">
-            <a:avLst/>
-          </a:prstGeom>
-          <a:noFill/>
-          <a:effectLst>
-            <a:outerShdw blurRad="63500" sx="102000" sy="102000" algn="ctr" rotWithShape="0">
-              <a:prstClr val="black">
-                <a:alpha val="40000"/>
-              </a:prstClr>
-            </a:outerShdw>
-          </a:effectLst>
-        </p:spPr>
-        <p:txBody>
-          <a:bodyPr wrap="square" rtlCol="0" anchor="ctr">
-            <a:spAutoFit/>
-          </a:bodyPr>
-          <a:lstStyle/>
-          <a:p>
-            <a:pPr algn="ctr"/>
-            <a:r>
-              <a:rPr lang="de-DE" sz="1600">
-                <a:solidFill>
-                  <a:schemeClr val="tx1">
-                    <a:lumMod val="95000"/>
-                    <a:lumOff val="5000"/>
-                  </a:schemeClr>
-                </a:solidFill>
-                <a:effectLst>
-                  <a:outerShdw blurRad="38100" dist="38100" dir="2700000" algn="tl">
-                    <a:srgbClr val="000000">
-                      <a:alpha val="43137"/>
-                    </a:srgbClr>
-                  </a:outerShdw>
-                </a:effectLst>
-                <a:latin typeface="Roboto Medium" panose="02000000000000000000" pitchFamily="2" charset="0"/>
-                <a:ea typeface="Roboto Medium" panose="02000000000000000000" pitchFamily="2" charset="0"/>
-              </a:rPr>
-              <a:t>Poll message</a:t>
-            </a:r>
-            <a:endParaRPr lang="de-DE">
-              <a:solidFill>
-                <a:schemeClr val="tx1">
-                  <a:lumMod val="95000"/>
-                  <a:lumOff val="5000"/>
-                </a:schemeClr>
-              </a:solidFill>
-              <a:effectLst>
-                <a:outerShdw blurRad="38100" dist="38100" dir="2700000" algn="tl">
-                  <a:srgbClr val="000000">
-                    <a:alpha val="43137"/>
-                  </a:srgbClr>
-                </a:outerShdw>
-              </a:effectLst>
-              <a:latin typeface="Roboto Medium" panose="02000000000000000000" pitchFamily="2" charset="0"/>
-              <a:ea typeface="Roboto Medium" panose="02000000000000000000" pitchFamily="2" charset="0"/>
-            </a:endParaRPr>
-          </a:p>
-        </p:txBody>
-      </p:sp>
-      <p:sp>
-        <p:nvSpPr>
-          <p:cNvPr id="91" name="Textfeld 90">
-            <a:extLst>
-              <a:ext uri="{FF2B5EF4-FFF2-40B4-BE49-F238E27FC236}">
-                <a16:creationId xmlns:a16="http://schemas.microsoft.com/office/drawing/2014/main" id="{FB8F3D7B-3EEC-41E0-A10E-3A07D3341F5C}"/>
-              </a:ext>
-            </a:extLst>
-          </p:cNvPr>
-          <p:cNvSpPr txBox="1"/>
-          <p:nvPr/>
-        </p:nvSpPr>
-        <p:spPr>
-          <a:xfrm>
-            <a:off x="8317817" y="2215456"/>
-            <a:ext cx="3078489" cy="338554"/>
-          </a:xfrm>
-          <a:prstGeom prst="rect">
-            <a:avLst/>
-          </a:prstGeom>
-          <a:noFill/>
-          <a:effectLst>
-            <a:outerShdw blurRad="63500" sx="102000" sy="102000" algn="ctr" rotWithShape="0">
-              <a:prstClr val="black">
-                <a:alpha val="40000"/>
-              </a:prstClr>
-            </a:outerShdw>
-          </a:effectLst>
-        </p:spPr>
-        <p:txBody>
-          <a:bodyPr wrap="square" rtlCol="0" anchor="ctr">
-            <a:spAutoFit/>
-          </a:bodyPr>
-          <a:lstStyle/>
-          <a:p>
-            <a:pPr algn="ctr"/>
-            <a:r>
-              <a:rPr lang="de-DE" sz="1600">
-                <a:solidFill>
-                  <a:schemeClr val="tx1">
-                    <a:lumMod val="95000"/>
-                    <a:lumOff val="5000"/>
-                  </a:schemeClr>
-                </a:solidFill>
-                <a:effectLst>
-                  <a:outerShdw blurRad="38100" dist="38100" dir="2700000" algn="tl">
-                    <a:srgbClr val="000000">
-                      <a:alpha val="43137"/>
-                    </a:srgbClr>
-                  </a:outerShdw>
-                </a:effectLst>
-                <a:latin typeface="Roboto Medium" panose="02000000000000000000" pitchFamily="2" charset="0"/>
-                <a:ea typeface="Roboto Medium" panose="02000000000000000000" pitchFamily="2" charset="0"/>
-              </a:rPr>
-              <a:t>Poll message</a:t>
+              <a:t>Poll messages to send to client(id)</a:t>
             </a:r>
             <a:endParaRPr lang="de-DE">
               <a:solidFill>
@@ -12945,8 +12485,8 @@
         </p:nvSpPr>
         <p:spPr>
           <a:xfrm>
-            <a:off x="415938" y="4999244"/>
-            <a:ext cx="3078489" cy="338554"/>
+            <a:off x="-256637" y="4727094"/>
+            <a:ext cx="2693968" cy="584775"/>
           </a:xfrm>
           <a:prstGeom prst="rect">
             <a:avLst/>
@@ -12987,6 +12527,29 @@
               </a:rPr>
               <a:t>Get messages</a:t>
             </a:r>
+          </a:p>
+          <a:p>
+            <a:pPr algn="ctr"/>
+            <a:r>
+              <a:rPr lang="de-DE" sz="1600">
+                <a:solidFill>
+                  <a:schemeClr val="tx1">
+                    <a:lumMod val="95000"/>
+                    <a:lumOff val="5000"/>
+                  </a:schemeClr>
+                </a:solidFill>
+                <a:effectLst>
+                  <a:outerShdw blurRad="38100" dist="38100" dir="2700000" algn="tl">
+                    <a:srgbClr val="000000">
+                      <a:alpha val="43137"/>
+                    </a:srgbClr>
+                  </a:outerShdw>
+                </a:effectLst>
+                <a:latin typeface="Roboto Medium" panose="02000000000000000000" pitchFamily="2" charset="0"/>
+                <a:ea typeface="Roboto Medium" panose="02000000000000000000" pitchFamily="2" charset="0"/>
+              </a:rPr>
+              <a:t>on startup</a:t>
+            </a:r>
             <a:endParaRPr lang="de-DE">
               <a:solidFill>
                 <a:schemeClr val="tx1">
@@ -13021,8 +12584,8 @@
         </p:nvSpPr>
         <p:spPr>
           <a:xfrm>
-            <a:off x="3411439" y="5266412"/>
-            <a:ext cx="3078489" cy="338554"/>
+            <a:off x="2990623" y="5414441"/>
+            <a:ext cx="3078489" cy="584775"/>
           </a:xfrm>
           <a:prstGeom prst="rect">
             <a:avLst/>
@@ -13061,7 +12624,30 @@
                 <a:latin typeface="Roboto Medium" panose="02000000000000000000" pitchFamily="2" charset="0"/>
                 <a:ea typeface="Roboto Medium" panose="02000000000000000000" pitchFamily="2" charset="0"/>
               </a:rPr>
-              <a:t>Add message</a:t>
+              <a:t>Add message to db</a:t>
+            </a:r>
+          </a:p>
+          <a:p>
+            <a:pPr algn="ctr"/>
+            <a:r>
+              <a:rPr lang="de-DE" sz="1600">
+                <a:solidFill>
+                  <a:schemeClr val="tx1">
+                    <a:lumMod val="95000"/>
+                    <a:lumOff val="5000"/>
+                  </a:schemeClr>
+                </a:solidFill>
+                <a:effectLst>
+                  <a:outerShdw blurRad="38100" dist="38100" dir="2700000" algn="tl">
+                    <a:srgbClr val="000000">
+                      <a:alpha val="43137"/>
+                    </a:srgbClr>
+                  </a:outerShdw>
+                </a:effectLst>
+                <a:latin typeface="Roboto Medium" panose="02000000000000000000" pitchFamily="2" charset="0"/>
+                <a:ea typeface="Roboto Medium" panose="02000000000000000000" pitchFamily="2" charset="0"/>
+              </a:rPr>
+              <a:t>Update message in db</a:t>
             </a:r>
             <a:endParaRPr lang="de-DE">
               <a:solidFill>
@@ -13097,7 +12683,7 @@
         </p:nvSpPr>
         <p:spPr>
           <a:xfrm>
-            <a:off x="826308" y="2164676"/>
+            <a:off x="235359" y="461691"/>
             <a:ext cx="3078489" cy="338554"/>
           </a:xfrm>
           <a:prstGeom prst="rect">
@@ -13137,83 +12723,7 @@
                 <a:latin typeface="Roboto Medium" panose="02000000000000000000" pitchFamily="2" charset="0"/>
                 <a:ea typeface="Roboto Medium" panose="02000000000000000000" pitchFamily="2" charset="0"/>
               </a:rPr>
-              <a:t>Add message</a:t>
-            </a:r>
-            <a:endParaRPr lang="de-DE">
-              <a:solidFill>
-                <a:schemeClr val="tx1">
-                  <a:lumMod val="95000"/>
-                  <a:lumOff val="5000"/>
-                </a:schemeClr>
-              </a:solidFill>
-              <a:effectLst>
-                <a:outerShdw blurRad="38100" dist="38100" dir="2700000" algn="tl">
-                  <a:srgbClr val="000000">
-                    <a:alpha val="43137"/>
-                  </a:srgbClr>
-                </a:outerShdw>
-              </a:effectLst>
-              <a:latin typeface="Roboto Medium" panose="02000000000000000000" pitchFamily="2" charset="0"/>
-              <a:ea typeface="Roboto Medium" panose="02000000000000000000" pitchFamily="2" charset="0"/>
-            </a:endParaRPr>
-          </a:p>
-        </p:txBody>
-      </p:sp>
-      <p:sp>
-        <p:nvSpPr>
-          <p:cNvPr id="96" name="Textfeld 95">
-            <a:extLst>
-              <a:ext uri="{FF2B5EF4-FFF2-40B4-BE49-F238E27FC236}">
-                <a16:creationId xmlns:a16="http://schemas.microsoft.com/office/drawing/2014/main" id="{0D8B5E53-8857-487E-97EF-8B9BFD560BD1}"/>
-              </a:ext>
-            </a:extLst>
-          </p:cNvPr>
-          <p:cNvSpPr txBox="1"/>
-          <p:nvPr/>
-        </p:nvSpPr>
-        <p:spPr>
-          <a:xfrm>
-            <a:off x="344511" y="3548776"/>
-            <a:ext cx="3078489" cy="338554"/>
-          </a:xfrm>
-          <a:prstGeom prst="rect">
-            <a:avLst/>
-          </a:prstGeom>
-          <a:noFill/>
-          <a:effectLst>
-            <a:outerShdw blurRad="63500" sx="102000" sy="102000" algn="ctr" rotWithShape="0">
-              <a:prstClr val="black">
-                <a:alpha val="40000"/>
-              </a:prstClr>
-            </a:outerShdw>
-          </a:effectLst>
-        </p:spPr>
-        <p:txBody>
-          <a:bodyPr wrap="square" rtlCol="0" anchor="ctr">
-            <a:spAutoFit/>
-          </a:bodyPr>
-          <a:lstStyle/>
-          <a:p>
-            <a:pPr algn="ctr"/>
-            <a:r>
-              <a:rPr lang="de-DE" sz="1600">
-                <a:solidFill>
-                  <a:schemeClr val="tx1">
-                    <a:lumMod val="95000"/>
-                    <a:lumOff val="5000"/>
-                  </a:schemeClr>
-                </a:solidFill>
-                <a:effectLst>
-                  <a:outerShdw blurRad="38100" dist="38100" dir="2700000" algn="tl">
-                    <a:srgbClr val="000000">
-                      <a:alpha val="43137"/>
-                    </a:srgbClr>
-                  </a:outerShdw>
-                </a:effectLst>
-                <a:latin typeface="Roboto Medium" panose="02000000000000000000" pitchFamily="2" charset="0"/>
-                <a:ea typeface="Roboto Medium" panose="02000000000000000000" pitchFamily="2" charset="0"/>
-              </a:rPr>
-              <a:t>Add message</a:t>
+              <a:t>Get message to send</a:t>
             </a:r>
             <a:endParaRPr lang="de-DE">
               <a:solidFill>
@@ -13434,6 +12944,254 @@
           </a:fontRef>
         </p:style>
       </p:cxnSp>
+      <p:sp>
+        <p:nvSpPr>
+          <p:cNvPr id="56" name="Textfeld 55">
+            <a:extLst>
+              <a:ext uri="{FF2B5EF4-FFF2-40B4-BE49-F238E27FC236}">
+                <a16:creationId xmlns:a16="http://schemas.microsoft.com/office/drawing/2014/main" id="{8A0CD288-FE51-41FC-98A9-E2567373C928}"/>
+              </a:ext>
+            </a:extLst>
+          </p:cNvPr>
+          <p:cNvSpPr txBox="1"/>
+          <p:nvPr/>
+        </p:nvSpPr>
+        <p:spPr>
+          <a:xfrm>
+            <a:off x="1276724" y="2636623"/>
+            <a:ext cx="3078489" cy="338554"/>
+          </a:xfrm>
+          <a:prstGeom prst="rect">
+            <a:avLst/>
+          </a:prstGeom>
+          <a:noFill/>
+          <a:effectLst>
+            <a:outerShdw blurRad="63500" sx="102000" sy="102000" algn="ctr" rotWithShape="0">
+              <a:prstClr val="black">
+                <a:alpha val="40000"/>
+              </a:prstClr>
+            </a:outerShdw>
+          </a:effectLst>
+        </p:spPr>
+        <p:txBody>
+          <a:bodyPr wrap="square" rtlCol="0" anchor="ctr">
+            <a:spAutoFit/>
+          </a:bodyPr>
+          <a:lstStyle/>
+          <a:p>
+            <a:pPr algn="ctr"/>
+            <a:r>
+              <a:rPr lang="de-DE" sz="1600">
+                <a:solidFill>
+                  <a:schemeClr val="tx1">
+                    <a:lumMod val="95000"/>
+                    <a:lumOff val="5000"/>
+                  </a:schemeClr>
+                </a:solidFill>
+                <a:effectLst>
+                  <a:outerShdw blurRad="38100" dist="38100" dir="2700000" algn="tl">
+                    <a:srgbClr val="000000">
+                      <a:alpha val="43137"/>
+                    </a:srgbClr>
+                  </a:outerShdw>
+                </a:effectLst>
+                <a:latin typeface="Roboto Medium" panose="02000000000000000000" pitchFamily="2" charset="0"/>
+                <a:ea typeface="Roboto Medium" panose="02000000000000000000" pitchFamily="2" charset="0"/>
+              </a:rPr>
+              <a:t>Get message to store/update</a:t>
+            </a:r>
+            <a:endParaRPr lang="de-DE">
+              <a:solidFill>
+                <a:schemeClr val="tx1">
+                  <a:lumMod val="95000"/>
+                  <a:lumOff val="5000"/>
+                </a:schemeClr>
+              </a:solidFill>
+              <a:effectLst>
+                <a:outerShdw blurRad="38100" dist="38100" dir="2700000" algn="tl">
+                  <a:srgbClr val="000000">
+                    <a:alpha val="43137"/>
+                  </a:srgbClr>
+                </a:outerShdw>
+              </a:effectLst>
+              <a:latin typeface="Roboto Medium" panose="02000000000000000000" pitchFamily="2" charset="0"/>
+              <a:ea typeface="Roboto Medium" panose="02000000000000000000" pitchFamily="2" charset="0"/>
+            </a:endParaRPr>
+          </a:p>
+        </p:txBody>
+      </p:sp>
+      <p:cxnSp>
+        <p:nvCxnSpPr>
+          <p:cNvPr id="60" name="Verbinder: gewinkelt 59">
+            <a:extLst>
+              <a:ext uri="{FF2B5EF4-FFF2-40B4-BE49-F238E27FC236}">
+                <a16:creationId xmlns:a16="http://schemas.microsoft.com/office/drawing/2014/main" id="{643D930E-3F97-4855-AEBC-9CC1A8F682B6}"/>
+              </a:ext>
+            </a:extLst>
+          </p:cNvPr>
+          <p:cNvCxnSpPr>
+            <a:cxnSpLocks/>
+            <a:stCxn id="13" idx="2"/>
+            <a:endCxn id="80" idx="1"/>
+          </p:cNvCxnSpPr>
+          <p:nvPr/>
+        </p:nvCxnSpPr>
+        <p:spPr>
+          <a:xfrm rot="5400000">
+            <a:off x="2159918" y="-252446"/>
+            <a:ext cx="448254" cy="3301169"/>
+          </a:xfrm>
+          <a:prstGeom prst="bentConnector3">
+            <a:avLst>
+              <a:gd name="adj1" fmla="val 20056"/>
+            </a:avLst>
+          </a:prstGeom>
+          <a:ln w="57150">
+            <a:solidFill>
+              <a:srgbClr val="00B0F0"/>
+            </a:solidFill>
+            <a:tailEnd type="triangle"/>
+          </a:ln>
+        </p:spPr>
+        <p:style>
+          <a:lnRef idx="1">
+            <a:schemeClr val="accent1"/>
+          </a:lnRef>
+          <a:fillRef idx="0">
+            <a:schemeClr val="accent1"/>
+          </a:fillRef>
+          <a:effectRef idx="0">
+            <a:schemeClr val="accent1"/>
+          </a:effectRef>
+          <a:fontRef idx="minor">
+            <a:schemeClr val="tx1"/>
+          </a:fontRef>
+        </p:style>
+      </p:cxnSp>
+      <p:cxnSp>
+        <p:nvCxnSpPr>
+          <p:cNvPr id="63" name="Verbinder: gewinkelt 62">
+            <a:extLst>
+              <a:ext uri="{FF2B5EF4-FFF2-40B4-BE49-F238E27FC236}">
+                <a16:creationId xmlns:a16="http://schemas.microsoft.com/office/drawing/2014/main" id="{9835AED9-5E70-4556-9BC9-E46DF64A2039}"/>
+              </a:ext>
+            </a:extLst>
+          </p:cNvPr>
+          <p:cNvCxnSpPr>
+            <a:cxnSpLocks/>
+            <a:stCxn id="14" idx="2"/>
+            <a:endCxn id="80" idx="1"/>
+          </p:cNvCxnSpPr>
+          <p:nvPr/>
+        </p:nvCxnSpPr>
+        <p:spPr>
+          <a:xfrm rot="5400000" flipH="1">
+            <a:off x="2149262" y="206464"/>
+            <a:ext cx="469565" cy="3301169"/>
+          </a:xfrm>
+          <a:prstGeom prst="bentConnector3">
+            <a:avLst>
+              <a:gd name="adj1" fmla="val -23248"/>
+            </a:avLst>
+          </a:prstGeom>
+          <a:ln w="57150">
+            <a:solidFill>
+              <a:srgbClr val="00B0F0"/>
+            </a:solidFill>
+            <a:tailEnd type="triangle"/>
+          </a:ln>
+        </p:spPr>
+        <p:style>
+          <a:lnRef idx="1">
+            <a:schemeClr val="accent1"/>
+          </a:lnRef>
+          <a:fillRef idx="0">
+            <a:schemeClr val="accent1"/>
+          </a:fillRef>
+          <a:effectRef idx="0">
+            <a:schemeClr val="accent1"/>
+          </a:effectRef>
+          <a:fontRef idx="minor">
+            <a:schemeClr val="tx1"/>
+          </a:fontRef>
+        </p:style>
+      </p:cxnSp>
+      <p:sp>
+        <p:nvSpPr>
+          <p:cNvPr id="70" name="Textfeld 69">
+            <a:extLst>
+              <a:ext uri="{FF2B5EF4-FFF2-40B4-BE49-F238E27FC236}">
+                <a16:creationId xmlns:a16="http://schemas.microsoft.com/office/drawing/2014/main" id="{5F992E79-1467-4F3F-AF65-E8563308527E}"/>
+              </a:ext>
+            </a:extLst>
+          </p:cNvPr>
+          <p:cNvSpPr txBox="1"/>
+          <p:nvPr/>
+        </p:nvSpPr>
+        <p:spPr>
+          <a:xfrm>
+            <a:off x="454708" y="1531118"/>
+            <a:ext cx="3078489" cy="338554"/>
+          </a:xfrm>
+          <a:prstGeom prst="rect">
+            <a:avLst/>
+          </a:prstGeom>
+          <a:noFill/>
+          <a:effectLst>
+            <a:outerShdw blurRad="63500" sx="102000" sy="102000" algn="ctr" rotWithShape="0">
+              <a:prstClr val="black">
+                <a:alpha val="40000"/>
+              </a:prstClr>
+            </a:outerShdw>
+          </a:effectLst>
+        </p:spPr>
+        <p:txBody>
+          <a:bodyPr wrap="square" rtlCol="0" anchor="ctr">
+            <a:spAutoFit/>
+          </a:bodyPr>
+          <a:lstStyle/>
+          <a:p>
+            <a:pPr algn="ctr"/>
+            <a:r>
+              <a:rPr lang="de-DE" sz="1600">
+                <a:solidFill>
+                  <a:schemeClr val="tx1">
+                    <a:lumMod val="95000"/>
+                    <a:lumOff val="5000"/>
+                  </a:schemeClr>
+                </a:solidFill>
+                <a:effectLst>
+                  <a:outerShdw blurRad="38100" dist="38100" dir="2700000" algn="tl">
+                    <a:srgbClr val="000000">
+                      <a:alpha val="43137"/>
+                    </a:srgbClr>
+                  </a:outerShdw>
+                </a:effectLst>
+                <a:latin typeface="Roboto Medium" panose="02000000000000000000" pitchFamily="2" charset="0"/>
+                <a:ea typeface="Roboto Medium" panose="02000000000000000000" pitchFamily="2" charset="0"/>
+              </a:rPr>
+              <a:t>Add / Change messages</a:t>
+            </a:r>
+            <a:endParaRPr lang="de-DE">
+              <a:solidFill>
+                <a:schemeClr val="tx1">
+                  <a:lumMod val="95000"/>
+                  <a:lumOff val="5000"/>
+                </a:schemeClr>
+              </a:solidFill>
+              <a:effectLst>
+                <a:outerShdw blurRad="38100" dist="38100" dir="2700000" algn="tl">
+                  <a:srgbClr val="000000">
+                    <a:alpha val="43137"/>
+                  </a:srgbClr>
+                </a:outerShdw>
+              </a:effectLst>
+              <a:latin typeface="Roboto Medium" panose="02000000000000000000" pitchFamily="2" charset="0"/>
+              <a:ea typeface="Roboto Medium" panose="02000000000000000000" pitchFamily="2" charset="0"/>
+            </a:endParaRPr>
+          </a:p>
+        </p:txBody>
+      </p:sp>
     </p:spTree>
     <p:extLst>
       <p:ext uri="{BB962C8B-B14F-4D97-AF65-F5344CB8AC3E}">
@@ -13505,10 +13263,10 @@
       </p:cxnSp>
       <p:sp>
         <p:nvSpPr>
-          <p:cNvPr id="7" name="Rechteck 6">
-            <a:extLst>
-              <a:ext uri="{FF2B5EF4-FFF2-40B4-BE49-F238E27FC236}">
-                <a16:creationId xmlns:a16="http://schemas.microsoft.com/office/drawing/2014/main" id="{CB1961FB-49D3-4536-BB77-3E8EA3CBF647}"/>
+          <p:cNvPr id="8" name="Rechteck 7">
+            <a:extLst>
+              <a:ext uri="{FF2B5EF4-FFF2-40B4-BE49-F238E27FC236}">
+                <a16:creationId xmlns:a16="http://schemas.microsoft.com/office/drawing/2014/main" id="{A74245E2-68D4-4147-848E-2BF73C207747}"/>
               </a:ext>
             </a:extLst>
           </p:cNvPr>
@@ -13517,8 +13275,8 @@
         </p:nvSpPr>
         <p:spPr>
           <a:xfrm>
-            <a:off x="8317817" y="343948"/>
-            <a:ext cx="3078496" cy="2293838"/>
+            <a:off x="1993954" y="329292"/>
+            <a:ext cx="2893864" cy="1853918"/>
           </a:xfrm>
           <a:prstGeom prst="rect">
             <a:avLst/>
@@ -13561,10 +13319,10 @@
       </p:sp>
       <p:sp>
         <p:nvSpPr>
-          <p:cNvPr id="8" name="Rechteck 7">
-            <a:extLst>
-              <a:ext uri="{FF2B5EF4-FFF2-40B4-BE49-F238E27FC236}">
-                <a16:creationId xmlns:a16="http://schemas.microsoft.com/office/drawing/2014/main" id="{A74245E2-68D4-4147-848E-2BF73C207747}"/>
+          <p:cNvPr id="13" name="Rechteck 12">
+            <a:extLst>
+              <a:ext uri="{FF2B5EF4-FFF2-40B4-BE49-F238E27FC236}">
+                <a16:creationId xmlns:a16="http://schemas.microsoft.com/office/drawing/2014/main" id="{19228D35-9D92-450C-9FE1-7021FA2E7B27}"/>
               </a:ext>
             </a:extLst>
           </p:cNvPr>
@@ -13573,8 +13331,120 @@
         </p:nvSpPr>
         <p:spPr>
           <a:xfrm>
-            <a:off x="1993954" y="329292"/>
-            <a:ext cx="2893864" cy="1853918"/>
+            <a:off x="3301465" y="457041"/>
+            <a:ext cx="1466327" cy="716970"/>
+          </a:xfrm>
+          <a:prstGeom prst="rect">
+            <a:avLst/>
+          </a:prstGeom>
+        </p:spPr>
+        <p:style>
+          <a:lnRef idx="2">
+            <a:schemeClr val="accent6">
+              <a:shade val="50000"/>
+            </a:schemeClr>
+          </a:lnRef>
+          <a:fillRef idx="1">
+            <a:schemeClr val="accent6"/>
+          </a:fillRef>
+          <a:effectRef idx="0">
+            <a:schemeClr val="accent6"/>
+          </a:effectRef>
+          <a:fontRef idx="minor">
+            <a:schemeClr val="lt1"/>
+          </a:fontRef>
+        </p:style>
+        <p:txBody>
+          <a:bodyPr rtlCol="0" anchor="ctr"/>
+          <a:lstStyle/>
+          <a:p>
+            <a:pPr algn="ctr"/>
+            <a:r>
+              <a:rPr lang="de-DE" sz="1400" err="1">
+                <a:latin typeface="Roboto Medium" panose="02000000000000000000" pitchFamily="2" charset="0"/>
+                <a:ea typeface="Roboto Medium" panose="02000000000000000000" pitchFamily="2" charset="0"/>
+              </a:rPr>
+              <a:t>SendService</a:t>
+            </a:r>
+            <a:endParaRPr lang="de-DE" sz="1400">
+              <a:latin typeface="Roboto Medium" panose="02000000000000000000" pitchFamily="2" charset="0"/>
+              <a:ea typeface="Roboto Medium" panose="02000000000000000000" pitchFamily="2" charset="0"/>
+            </a:endParaRPr>
+          </a:p>
+        </p:txBody>
+      </p:sp>
+      <p:sp>
+        <p:nvSpPr>
+          <p:cNvPr id="14" name="Rechteck 13">
+            <a:extLst>
+              <a:ext uri="{FF2B5EF4-FFF2-40B4-BE49-F238E27FC236}">
+                <a16:creationId xmlns:a16="http://schemas.microsoft.com/office/drawing/2014/main" id="{01AF9F2E-4594-42ED-8681-092B344BEF8A}"/>
+              </a:ext>
+            </a:extLst>
+          </p:cNvPr>
+          <p:cNvSpPr/>
+          <p:nvPr/>
+        </p:nvSpPr>
+        <p:spPr>
+          <a:xfrm>
+            <a:off x="3301465" y="1374860"/>
+            <a:ext cx="1466327" cy="716970"/>
+          </a:xfrm>
+          <a:prstGeom prst="rect">
+            <a:avLst/>
+          </a:prstGeom>
+        </p:spPr>
+        <p:style>
+          <a:lnRef idx="2">
+            <a:schemeClr val="accent6">
+              <a:shade val="50000"/>
+            </a:schemeClr>
+          </a:lnRef>
+          <a:fillRef idx="1">
+            <a:schemeClr val="accent6"/>
+          </a:fillRef>
+          <a:effectRef idx="0">
+            <a:schemeClr val="accent6"/>
+          </a:effectRef>
+          <a:fontRef idx="minor">
+            <a:schemeClr val="lt1"/>
+          </a:fontRef>
+        </p:style>
+        <p:txBody>
+          <a:bodyPr rtlCol="0" anchor="ctr"/>
+          <a:lstStyle/>
+          <a:p>
+            <a:pPr algn="ctr"/>
+            <a:r>
+              <a:rPr lang="de-DE" sz="1400" err="1">
+                <a:latin typeface="Roboto Medium" panose="02000000000000000000" pitchFamily="2" charset="0"/>
+                <a:ea typeface="Roboto Medium" panose="02000000000000000000" pitchFamily="2" charset="0"/>
+              </a:rPr>
+              <a:t>ReceiveService</a:t>
+            </a:r>
+            <a:endParaRPr lang="de-DE" sz="1400">
+              <a:latin typeface="Roboto Medium" panose="02000000000000000000" pitchFamily="2" charset="0"/>
+              <a:ea typeface="Roboto Medium" panose="02000000000000000000" pitchFamily="2" charset="0"/>
+            </a:endParaRPr>
+          </a:p>
+        </p:txBody>
+      </p:sp>
+      <p:sp>
+        <p:nvSpPr>
+          <p:cNvPr id="20" name="Rechteck 19">
+            <a:extLst>
+              <a:ext uri="{FF2B5EF4-FFF2-40B4-BE49-F238E27FC236}">
+                <a16:creationId xmlns:a16="http://schemas.microsoft.com/office/drawing/2014/main" id="{7EF17ABA-15C7-48CD-9AE1-5AD09EF9F8F7}"/>
+              </a:ext>
+            </a:extLst>
+          </p:cNvPr>
+          <p:cNvSpPr/>
+          <p:nvPr/>
+        </p:nvSpPr>
+        <p:spPr>
+          <a:xfrm>
+            <a:off x="1965514" y="3006741"/>
+            <a:ext cx="2917186" cy="1853918"/>
           </a:xfrm>
           <a:prstGeom prst="rect">
             <a:avLst/>
@@ -13615,286 +13485,6 @@
           </a:p>
         </p:txBody>
       </p:sp>
-      <p:sp>
-        <p:nvSpPr>
-          <p:cNvPr id="13" name="Rechteck 12">
-            <a:extLst>
-              <a:ext uri="{FF2B5EF4-FFF2-40B4-BE49-F238E27FC236}">
-                <a16:creationId xmlns:a16="http://schemas.microsoft.com/office/drawing/2014/main" id="{19228D35-9D92-450C-9FE1-7021FA2E7B27}"/>
-              </a:ext>
-            </a:extLst>
-          </p:cNvPr>
-          <p:cNvSpPr/>
-          <p:nvPr/>
-        </p:nvSpPr>
-        <p:spPr>
-          <a:xfrm>
-            <a:off x="3301465" y="457041"/>
-            <a:ext cx="1466327" cy="716970"/>
-          </a:xfrm>
-          <a:prstGeom prst="rect">
-            <a:avLst/>
-          </a:prstGeom>
-        </p:spPr>
-        <p:style>
-          <a:lnRef idx="2">
-            <a:schemeClr val="accent6">
-              <a:shade val="50000"/>
-            </a:schemeClr>
-          </a:lnRef>
-          <a:fillRef idx="1">
-            <a:schemeClr val="accent6"/>
-          </a:fillRef>
-          <a:effectRef idx="0">
-            <a:schemeClr val="accent6"/>
-          </a:effectRef>
-          <a:fontRef idx="minor">
-            <a:schemeClr val="lt1"/>
-          </a:fontRef>
-        </p:style>
-        <p:txBody>
-          <a:bodyPr rtlCol="0" anchor="ctr"/>
-          <a:lstStyle/>
-          <a:p>
-            <a:pPr algn="ctr"/>
-            <a:r>
-              <a:rPr lang="de-DE" sz="1400" err="1">
-                <a:latin typeface="Roboto Medium" panose="02000000000000000000" pitchFamily="2" charset="0"/>
-                <a:ea typeface="Roboto Medium" panose="02000000000000000000" pitchFamily="2" charset="0"/>
-              </a:rPr>
-              <a:t>SendService</a:t>
-            </a:r>
-            <a:endParaRPr lang="de-DE" sz="1400">
-              <a:latin typeface="Roboto Medium" panose="02000000000000000000" pitchFamily="2" charset="0"/>
-              <a:ea typeface="Roboto Medium" panose="02000000000000000000" pitchFamily="2" charset="0"/>
-            </a:endParaRPr>
-          </a:p>
-        </p:txBody>
-      </p:sp>
-      <p:sp>
-        <p:nvSpPr>
-          <p:cNvPr id="14" name="Rechteck 13">
-            <a:extLst>
-              <a:ext uri="{FF2B5EF4-FFF2-40B4-BE49-F238E27FC236}">
-                <a16:creationId xmlns:a16="http://schemas.microsoft.com/office/drawing/2014/main" id="{01AF9F2E-4594-42ED-8681-092B344BEF8A}"/>
-              </a:ext>
-            </a:extLst>
-          </p:cNvPr>
-          <p:cNvSpPr/>
-          <p:nvPr/>
-        </p:nvSpPr>
-        <p:spPr>
-          <a:xfrm>
-            <a:off x="3301465" y="1374860"/>
-            <a:ext cx="1466327" cy="716970"/>
-          </a:xfrm>
-          <a:prstGeom prst="rect">
-            <a:avLst/>
-          </a:prstGeom>
-        </p:spPr>
-        <p:style>
-          <a:lnRef idx="2">
-            <a:schemeClr val="accent6">
-              <a:shade val="50000"/>
-            </a:schemeClr>
-          </a:lnRef>
-          <a:fillRef idx="1">
-            <a:schemeClr val="accent6"/>
-          </a:fillRef>
-          <a:effectRef idx="0">
-            <a:schemeClr val="accent6"/>
-          </a:effectRef>
-          <a:fontRef idx="minor">
-            <a:schemeClr val="lt1"/>
-          </a:fontRef>
-        </p:style>
-        <p:txBody>
-          <a:bodyPr rtlCol="0" anchor="ctr"/>
-          <a:lstStyle/>
-          <a:p>
-            <a:pPr algn="ctr"/>
-            <a:r>
-              <a:rPr lang="de-DE" sz="1400" err="1">
-                <a:latin typeface="Roboto Medium" panose="02000000000000000000" pitchFamily="2" charset="0"/>
-                <a:ea typeface="Roboto Medium" panose="02000000000000000000" pitchFamily="2" charset="0"/>
-              </a:rPr>
-              <a:t>ReceiveService</a:t>
-            </a:r>
-            <a:endParaRPr lang="de-DE" sz="1400">
-              <a:latin typeface="Roboto Medium" panose="02000000000000000000" pitchFamily="2" charset="0"/>
-              <a:ea typeface="Roboto Medium" panose="02000000000000000000" pitchFamily="2" charset="0"/>
-            </a:endParaRPr>
-          </a:p>
-        </p:txBody>
-      </p:sp>
-      <p:sp>
-        <p:nvSpPr>
-          <p:cNvPr id="15" name="Rechteck 14">
-            <a:extLst>
-              <a:ext uri="{FF2B5EF4-FFF2-40B4-BE49-F238E27FC236}">
-                <a16:creationId xmlns:a16="http://schemas.microsoft.com/office/drawing/2014/main" id="{4D030556-51E1-4257-8949-E64DA5D11313}"/>
-              </a:ext>
-            </a:extLst>
-          </p:cNvPr>
-          <p:cNvSpPr/>
-          <p:nvPr/>
-        </p:nvSpPr>
-        <p:spPr>
-          <a:xfrm>
-            <a:off x="8437843" y="442817"/>
-            <a:ext cx="1466326" cy="740762"/>
-          </a:xfrm>
-          <a:prstGeom prst="rect">
-            <a:avLst/>
-          </a:prstGeom>
-        </p:spPr>
-        <p:style>
-          <a:lnRef idx="2">
-            <a:schemeClr val="accent6">
-              <a:shade val="50000"/>
-            </a:schemeClr>
-          </a:lnRef>
-          <a:fillRef idx="1">
-            <a:schemeClr val="accent6"/>
-          </a:fillRef>
-          <a:effectRef idx="0">
-            <a:schemeClr val="accent6"/>
-          </a:effectRef>
-          <a:fontRef idx="minor">
-            <a:schemeClr val="lt1"/>
-          </a:fontRef>
-        </p:style>
-        <p:txBody>
-          <a:bodyPr rtlCol="0" anchor="ctr"/>
-          <a:lstStyle/>
-          <a:p>
-            <a:pPr algn="ctr"/>
-            <a:r>
-              <a:rPr lang="de-DE" sz="1400" err="1">
-                <a:latin typeface="Roboto Medium" panose="02000000000000000000" pitchFamily="2" charset="0"/>
-                <a:ea typeface="Roboto Medium" panose="02000000000000000000" pitchFamily="2" charset="0"/>
-              </a:rPr>
-              <a:t>ReceiveService</a:t>
-            </a:r>
-            <a:endParaRPr lang="de-DE" sz="1400">
-              <a:latin typeface="Roboto Medium" panose="02000000000000000000" pitchFamily="2" charset="0"/>
-              <a:ea typeface="Roboto Medium" panose="02000000000000000000" pitchFamily="2" charset="0"/>
-            </a:endParaRPr>
-          </a:p>
-        </p:txBody>
-      </p:sp>
-      <p:sp>
-        <p:nvSpPr>
-          <p:cNvPr id="16" name="Rechteck 15">
-            <a:extLst>
-              <a:ext uri="{FF2B5EF4-FFF2-40B4-BE49-F238E27FC236}">
-                <a16:creationId xmlns:a16="http://schemas.microsoft.com/office/drawing/2014/main" id="{C399BD46-D88F-4434-8D3B-B0AA480C67AB}"/>
-              </a:ext>
-            </a:extLst>
-          </p:cNvPr>
-          <p:cNvSpPr/>
-          <p:nvPr/>
-        </p:nvSpPr>
-        <p:spPr>
-          <a:xfrm>
-            <a:off x="8456995" y="1369943"/>
-            <a:ext cx="1327148" cy="716970"/>
-          </a:xfrm>
-          <a:prstGeom prst="rect">
-            <a:avLst/>
-          </a:prstGeom>
-        </p:spPr>
-        <p:style>
-          <a:lnRef idx="2">
-            <a:schemeClr val="accent6">
-              <a:shade val="50000"/>
-            </a:schemeClr>
-          </a:lnRef>
-          <a:fillRef idx="1">
-            <a:schemeClr val="accent6"/>
-          </a:fillRef>
-          <a:effectRef idx="0">
-            <a:schemeClr val="accent6"/>
-          </a:effectRef>
-          <a:fontRef idx="minor">
-            <a:schemeClr val="lt1"/>
-          </a:fontRef>
-        </p:style>
-        <p:txBody>
-          <a:bodyPr rtlCol="0" anchor="ctr"/>
-          <a:lstStyle/>
-          <a:p>
-            <a:pPr algn="ctr"/>
-            <a:r>
-              <a:rPr lang="de-DE" sz="1400" err="1">
-                <a:latin typeface="Roboto Medium" panose="02000000000000000000" pitchFamily="2" charset="0"/>
-                <a:ea typeface="Roboto Medium" panose="02000000000000000000" pitchFamily="2" charset="0"/>
-              </a:rPr>
-              <a:t>SendService</a:t>
-            </a:r>
-            <a:endParaRPr lang="de-DE" sz="1400">
-              <a:latin typeface="Roboto Medium" panose="02000000000000000000" pitchFamily="2" charset="0"/>
-              <a:ea typeface="Roboto Medium" panose="02000000000000000000" pitchFamily="2" charset="0"/>
-            </a:endParaRPr>
-          </a:p>
-        </p:txBody>
-      </p:sp>
-      <p:sp>
-        <p:nvSpPr>
-          <p:cNvPr id="20" name="Rechteck 19">
-            <a:extLst>
-              <a:ext uri="{FF2B5EF4-FFF2-40B4-BE49-F238E27FC236}">
-                <a16:creationId xmlns:a16="http://schemas.microsoft.com/office/drawing/2014/main" id="{7EF17ABA-15C7-48CD-9AE1-5AD09EF9F8F7}"/>
-              </a:ext>
-            </a:extLst>
-          </p:cNvPr>
-          <p:cNvSpPr/>
-          <p:nvPr/>
-        </p:nvSpPr>
-        <p:spPr>
-          <a:xfrm>
-            <a:off x="1965514" y="3006741"/>
-            <a:ext cx="2917186" cy="1853918"/>
-          </a:xfrm>
-          <a:prstGeom prst="rect">
-            <a:avLst/>
-          </a:prstGeom>
-          <a:effectLst>
-            <a:outerShdw blurRad="266700" sx="102000" sy="102000" algn="ctr" rotWithShape="0">
-              <a:prstClr val="black">
-                <a:alpha val="18000"/>
-              </a:prstClr>
-            </a:outerShdw>
-          </a:effectLst>
-        </p:spPr>
-        <p:style>
-          <a:lnRef idx="2">
-            <a:schemeClr val="accent1">
-              <a:shade val="50000"/>
-            </a:schemeClr>
-          </a:lnRef>
-          <a:fillRef idx="1">
-            <a:schemeClr val="accent1"/>
-          </a:fillRef>
-          <a:effectRef idx="0">
-            <a:schemeClr val="accent1"/>
-          </a:effectRef>
-          <a:fontRef idx="minor">
-            <a:schemeClr val="lt1"/>
-          </a:fontRef>
-        </p:style>
-        <p:txBody>
-          <a:bodyPr rtlCol="0" anchor="ctr"/>
-          <a:lstStyle/>
-          <a:p>
-            <a:pPr algn="ctr"/>
-            <a:endParaRPr lang="de-DE" sz="1400">
-              <a:latin typeface="Roboto Medium" panose="02000000000000000000" pitchFamily="2" charset="0"/>
-              <a:ea typeface="Roboto Medium" panose="02000000000000000000" pitchFamily="2" charset="0"/>
-            </a:endParaRPr>
-          </a:p>
-        </p:txBody>
-      </p:sp>
       <p:cxnSp>
         <p:nvCxnSpPr>
           <p:cNvPr id="34" name="Verbinder: gewinkelt 33">
@@ -13906,7 +13496,6 @@
           </p:cNvPr>
           <p:cNvCxnSpPr>
             <a:cxnSpLocks/>
-            <a:stCxn id="16" idx="1"/>
             <a:endCxn id="14" idx="3"/>
           </p:cNvCxnSpPr>
           <p:nvPr/>
@@ -13934,154 +13523,6 @@
           </a:fillRef>
           <a:effectRef idx="0">
             <a:schemeClr val="accent6"/>
-          </a:effectRef>
-          <a:fontRef idx="minor">
-            <a:schemeClr val="tx1"/>
-          </a:fontRef>
-        </p:style>
-      </p:cxnSp>
-      <p:sp>
-        <p:nvSpPr>
-          <p:cNvPr id="42" name="Rechteck 41">
-            <a:extLst>
-              <a:ext uri="{FF2B5EF4-FFF2-40B4-BE49-F238E27FC236}">
-                <a16:creationId xmlns:a16="http://schemas.microsoft.com/office/drawing/2014/main" id="{3D54A2EA-8C2B-4B01-86C1-8146A318E477}"/>
-              </a:ext>
-            </a:extLst>
-          </p:cNvPr>
-          <p:cNvSpPr/>
-          <p:nvPr/>
-        </p:nvSpPr>
-        <p:spPr>
-          <a:xfrm>
-            <a:off x="2102881" y="3948982"/>
-            <a:ext cx="1337261" cy="716970"/>
-          </a:xfrm>
-          <a:prstGeom prst="rect">
-            <a:avLst/>
-          </a:prstGeom>
-        </p:spPr>
-        <p:style>
-          <a:lnRef idx="2">
-            <a:schemeClr val="accent6">
-              <a:shade val="50000"/>
-            </a:schemeClr>
-          </a:lnRef>
-          <a:fillRef idx="1">
-            <a:schemeClr val="accent6"/>
-          </a:fillRef>
-          <a:effectRef idx="0">
-            <a:schemeClr val="accent6"/>
-          </a:effectRef>
-          <a:fontRef idx="minor">
-            <a:schemeClr val="lt1"/>
-          </a:fontRef>
-        </p:style>
-        <p:txBody>
-          <a:bodyPr rtlCol="0" anchor="ctr"/>
-          <a:lstStyle/>
-          <a:p>
-            <a:pPr algn="ctr"/>
-            <a:r>
-              <a:rPr lang="de-DE" sz="1400" err="1">
-                <a:latin typeface="Roboto Medium" panose="02000000000000000000" pitchFamily="2" charset="0"/>
-                <a:ea typeface="Roboto Medium" panose="02000000000000000000" pitchFamily="2" charset="0"/>
-              </a:rPr>
-              <a:t>ReadService</a:t>
-            </a:r>
-            <a:endParaRPr lang="de-DE" sz="1400">
-              <a:latin typeface="Roboto Medium" panose="02000000000000000000" pitchFamily="2" charset="0"/>
-              <a:ea typeface="Roboto Medium" panose="02000000000000000000" pitchFamily="2" charset="0"/>
-            </a:endParaRPr>
-          </a:p>
-        </p:txBody>
-      </p:sp>
-      <p:cxnSp>
-        <p:nvCxnSpPr>
-          <p:cNvPr id="48" name="Verbinder: gewinkelt 47">
-            <a:extLst>
-              <a:ext uri="{FF2B5EF4-FFF2-40B4-BE49-F238E27FC236}">
-                <a16:creationId xmlns:a16="http://schemas.microsoft.com/office/drawing/2014/main" id="{9D6B6128-E7CE-4385-B96D-CA604C03C2AF}"/>
-              </a:ext>
-            </a:extLst>
-          </p:cNvPr>
-          <p:cNvCxnSpPr>
-            <a:cxnSpLocks/>
-            <a:stCxn id="13" idx="1"/>
-            <a:endCxn id="21" idx="0"/>
-          </p:cNvCxnSpPr>
-          <p:nvPr/>
-        </p:nvCxnSpPr>
-        <p:spPr>
-          <a:xfrm rot="10800000" flipV="1">
-            <a:off x="3136085" y="815526"/>
-            <a:ext cx="165381" cy="1809672"/>
-          </a:xfrm>
-          <a:prstGeom prst="bentConnector2">
-            <a:avLst/>
-          </a:prstGeom>
-          <a:ln w="57150">
-            <a:solidFill>
-              <a:srgbClr val="00B0F0"/>
-            </a:solidFill>
-            <a:tailEnd type="triangle"/>
-          </a:ln>
-        </p:spPr>
-        <p:style>
-          <a:lnRef idx="1">
-            <a:schemeClr val="accent1"/>
-          </a:lnRef>
-          <a:fillRef idx="0">
-            <a:schemeClr val="accent1"/>
-          </a:fillRef>
-          <a:effectRef idx="0">
-            <a:schemeClr val="accent1"/>
-          </a:effectRef>
-          <a:fontRef idx="minor">
-            <a:schemeClr val="tx1"/>
-          </a:fontRef>
-        </p:style>
-      </p:cxnSp>
-      <p:cxnSp>
-        <p:nvCxnSpPr>
-          <p:cNvPr id="50" name="Verbinder: gewinkelt 49">
-            <a:extLst>
-              <a:ext uri="{FF2B5EF4-FFF2-40B4-BE49-F238E27FC236}">
-                <a16:creationId xmlns:a16="http://schemas.microsoft.com/office/drawing/2014/main" id="{13BDA07A-02E7-4AC7-9F6E-B46708C87D9F}"/>
-              </a:ext>
-            </a:extLst>
-          </p:cNvPr>
-          <p:cNvCxnSpPr>
-            <a:cxnSpLocks/>
-            <a:stCxn id="14" idx="1"/>
-            <a:endCxn id="21" idx="0"/>
-          </p:cNvCxnSpPr>
-          <p:nvPr/>
-        </p:nvCxnSpPr>
-        <p:spPr>
-          <a:xfrm rot="10800000" flipV="1">
-            <a:off x="3136085" y="1733344"/>
-            <a:ext cx="165381" cy="891853"/>
-          </a:xfrm>
-          <a:prstGeom prst="bentConnector2">
-            <a:avLst/>
-          </a:prstGeom>
-          <a:ln w="57150">
-            <a:solidFill>
-              <a:srgbClr val="00B0F0"/>
-            </a:solidFill>
-            <a:tailEnd type="triangle"/>
-          </a:ln>
-        </p:spPr>
-        <p:style>
-          <a:lnRef idx="1">
-            <a:schemeClr val="accent1"/>
-          </a:lnRef>
-          <a:fillRef idx="0">
-            <a:schemeClr val="accent1"/>
-          </a:fillRef>
-          <a:effectRef idx="0">
-            <a:schemeClr val="accent1"/>
           </a:effectRef>
           <a:fontRef idx="minor">
             <a:schemeClr val="tx1"/>
@@ -14166,10 +13607,10 @@
       </p:sp>
       <p:sp>
         <p:nvSpPr>
-          <p:cNvPr id="21" name="Rechteck 20">
-            <a:extLst>
-              <a:ext uri="{FF2B5EF4-FFF2-40B4-BE49-F238E27FC236}">
-                <a16:creationId xmlns:a16="http://schemas.microsoft.com/office/drawing/2014/main" id="{14FF07BE-4622-4C58-8AD8-E674962EEF14}"/>
+          <p:cNvPr id="22" name="Rechteck 21">
+            <a:extLst>
+              <a:ext uri="{FF2B5EF4-FFF2-40B4-BE49-F238E27FC236}">
+                <a16:creationId xmlns:a16="http://schemas.microsoft.com/office/drawing/2014/main" id="{31A45673-A05A-4F32-ABDA-7EED3F5AC1A4}"/>
               </a:ext>
             </a:extLst>
           </p:cNvPr>
@@ -14178,10 +13619,160 @@
         </p:nvSpPr>
         <p:spPr>
           <a:xfrm>
-            <a:off x="2529713" y="2625198"/>
+            <a:off x="2102881" y="3117822"/>
+            <a:ext cx="2664911" cy="1548130"/>
+          </a:xfrm>
+          <a:prstGeom prst="rect">
+            <a:avLst/>
+          </a:prstGeom>
+        </p:spPr>
+        <p:style>
+          <a:lnRef idx="2">
+            <a:schemeClr val="accent6">
+              <a:shade val="50000"/>
+            </a:schemeClr>
+          </a:lnRef>
+          <a:fillRef idx="1">
+            <a:schemeClr val="accent6"/>
+          </a:fillRef>
+          <a:effectRef idx="0">
+            <a:schemeClr val="accent6"/>
+          </a:effectRef>
+          <a:fontRef idx="minor">
+            <a:schemeClr val="lt1"/>
+          </a:fontRef>
+        </p:style>
+        <p:txBody>
+          <a:bodyPr rtlCol="0" anchor="ctr"/>
+          <a:lstStyle/>
+          <a:p>
+            <a:pPr algn="ctr"/>
+            <a:r>
+              <a:rPr lang="de-DE" sz="1400">
+                <a:latin typeface="Roboto Medium" panose="02000000000000000000" pitchFamily="2" charset="0"/>
+                <a:ea typeface="Roboto Medium" panose="02000000000000000000" pitchFamily="2" charset="0"/>
+              </a:rPr>
+              <a:t>DatabaseService</a:t>
+            </a:r>
+          </a:p>
+        </p:txBody>
+      </p:sp>
+      <p:sp>
+        <p:nvSpPr>
+          <p:cNvPr id="67" name="Rechteck 66">
+            <a:extLst>
+              <a:ext uri="{FF2B5EF4-FFF2-40B4-BE49-F238E27FC236}">
+                <a16:creationId xmlns:a16="http://schemas.microsoft.com/office/drawing/2014/main" id="{1D7A00AE-CB40-437A-9A88-11C904B2A2DE}"/>
+              </a:ext>
+            </a:extLst>
+          </p:cNvPr>
+          <p:cNvSpPr/>
+          <p:nvPr/>
+        </p:nvSpPr>
+        <p:spPr>
+          <a:xfrm>
+            <a:off x="2176193" y="5444415"/>
             <a:ext cx="1212742" cy="716970"/>
           </a:xfrm>
           <a:prstGeom prst="rect">
+            <a:avLst/>
+          </a:prstGeom>
+        </p:spPr>
+        <p:style>
+          <a:lnRef idx="2">
+            <a:schemeClr val="accent3">
+              <a:shade val="50000"/>
+            </a:schemeClr>
+          </a:lnRef>
+          <a:fillRef idx="1">
+            <a:schemeClr val="accent3"/>
+          </a:fillRef>
+          <a:effectRef idx="0">
+            <a:schemeClr val="accent3"/>
+          </a:effectRef>
+          <a:fontRef idx="minor">
+            <a:schemeClr val="lt1"/>
+          </a:fontRef>
+        </p:style>
+        <p:txBody>
+          <a:bodyPr rtlCol="0" anchor="ctr"/>
+          <a:lstStyle/>
+          <a:p>
+            <a:pPr algn="ctr"/>
+            <a:r>
+              <a:rPr lang="de-DE" sz="1400">
+                <a:latin typeface="Roboto Medium" panose="02000000000000000000" pitchFamily="2" charset="0"/>
+                <a:ea typeface="Roboto Medium" panose="02000000000000000000" pitchFamily="2" charset="0"/>
+              </a:rPr>
+              <a:t>DBManager</a:t>
+            </a:r>
+          </a:p>
+        </p:txBody>
+      </p:sp>
+      <p:cxnSp>
+        <p:nvCxnSpPr>
+          <p:cNvPr id="71" name="Verbinder: gewinkelt 70">
+            <a:extLst>
+              <a:ext uri="{FF2B5EF4-FFF2-40B4-BE49-F238E27FC236}">
+                <a16:creationId xmlns:a16="http://schemas.microsoft.com/office/drawing/2014/main" id="{238E2458-EBDA-4860-8281-03FB6D10CF1E}"/>
+              </a:ext>
+            </a:extLst>
+          </p:cNvPr>
+          <p:cNvCxnSpPr>
+            <a:cxnSpLocks/>
+            <a:stCxn id="22" idx="2"/>
+            <a:endCxn id="67" idx="3"/>
+          </p:cNvCxnSpPr>
+          <p:nvPr/>
+        </p:nvCxnSpPr>
+        <p:spPr>
+          <a:xfrm rot="5400000">
+            <a:off x="2843662" y="5211225"/>
+            <a:ext cx="1136948" cy="46402"/>
+          </a:xfrm>
+          <a:prstGeom prst="bentConnector2">
+            <a:avLst/>
+          </a:prstGeom>
+          <a:ln w="57150">
+            <a:solidFill>
+              <a:srgbClr val="00B0F0"/>
+            </a:solidFill>
+            <a:tailEnd type="triangle"/>
+          </a:ln>
+        </p:spPr>
+        <p:style>
+          <a:lnRef idx="1">
+            <a:schemeClr val="accent1"/>
+          </a:lnRef>
+          <a:fillRef idx="0">
+            <a:schemeClr val="accent1"/>
+          </a:fillRef>
+          <a:effectRef idx="0">
+            <a:schemeClr val="accent1"/>
+          </a:effectRef>
+          <a:fontRef idx="minor">
+            <a:schemeClr val="tx1"/>
+          </a:fontRef>
+        </p:style>
+      </p:cxnSp>
+      <p:sp>
+        <p:nvSpPr>
+          <p:cNvPr id="80" name="Gleichschenkliges Dreieck 79">
+            <a:extLst>
+              <a:ext uri="{FF2B5EF4-FFF2-40B4-BE49-F238E27FC236}">
+                <a16:creationId xmlns:a16="http://schemas.microsoft.com/office/drawing/2014/main" id="{AA488369-24D7-4D98-8C9A-0AB281F4F80D}"/>
+              </a:ext>
+            </a:extLst>
+          </p:cNvPr>
+          <p:cNvSpPr/>
+          <p:nvPr/>
+        </p:nvSpPr>
+        <p:spPr>
+          <a:xfrm rot="5400000">
+            <a:off x="-1630109" y="2369276"/>
+            <a:ext cx="4727138" cy="869546"/>
+          </a:xfrm>
+          <a:prstGeom prst="triangle">
             <a:avLst/>
           </a:prstGeom>
         </p:spPr>
@@ -14207,283 +13798,11 @@
           <a:p>
             <a:pPr algn="ctr"/>
             <a:r>
-              <a:rPr lang="de-DE" sz="1400" err="1">
-                <a:latin typeface="Roboto Medium" panose="02000000000000000000" pitchFamily="2" charset="0"/>
-                <a:ea typeface="Roboto Medium" panose="02000000000000000000" pitchFamily="2" charset="0"/>
-              </a:rPr>
-              <a:t>StoreQueue</a:t>
-            </a:r>
-            <a:endParaRPr lang="de-DE" sz="1400">
-              <a:latin typeface="Roboto Medium" panose="02000000000000000000" pitchFamily="2" charset="0"/>
-              <a:ea typeface="Roboto Medium" panose="02000000000000000000" pitchFamily="2" charset="0"/>
-            </a:endParaRPr>
-          </a:p>
-        </p:txBody>
-      </p:sp>
-      <p:sp>
-        <p:nvSpPr>
-          <p:cNvPr id="22" name="Rechteck 21">
-            <a:extLst>
-              <a:ext uri="{FF2B5EF4-FFF2-40B4-BE49-F238E27FC236}">
-                <a16:creationId xmlns:a16="http://schemas.microsoft.com/office/drawing/2014/main" id="{31A45673-A05A-4F32-ABDA-7EED3F5AC1A4}"/>
-              </a:ext>
-            </a:extLst>
-          </p:cNvPr>
-          <p:cNvSpPr/>
-          <p:nvPr/>
-        </p:nvSpPr>
-        <p:spPr>
-          <a:xfrm>
-            <a:off x="3555050" y="3948982"/>
-            <a:ext cx="1212742" cy="716970"/>
-          </a:xfrm>
-          <a:prstGeom prst="rect">
-            <a:avLst/>
-          </a:prstGeom>
-        </p:spPr>
-        <p:style>
-          <a:lnRef idx="2">
-            <a:schemeClr val="accent6">
-              <a:shade val="50000"/>
-            </a:schemeClr>
-          </a:lnRef>
-          <a:fillRef idx="1">
-            <a:schemeClr val="accent6"/>
-          </a:fillRef>
-          <a:effectRef idx="0">
-            <a:schemeClr val="accent6"/>
-          </a:effectRef>
-          <a:fontRef idx="minor">
-            <a:schemeClr val="lt1"/>
-          </a:fontRef>
-        </p:style>
-        <p:txBody>
-          <a:bodyPr rtlCol="0" anchor="ctr"/>
-          <a:lstStyle/>
-          <a:p>
-            <a:pPr algn="ctr"/>
-            <a:r>
-              <a:rPr lang="de-DE" sz="1400" err="1">
-                <a:latin typeface="Roboto Medium" panose="02000000000000000000" pitchFamily="2" charset="0"/>
-                <a:ea typeface="Roboto Medium" panose="02000000000000000000" pitchFamily="2" charset="0"/>
-              </a:rPr>
-              <a:t>StoreService</a:t>
-            </a:r>
-            <a:endParaRPr lang="de-DE" sz="1400">
-              <a:latin typeface="Roboto Medium" panose="02000000000000000000" pitchFamily="2" charset="0"/>
-              <a:ea typeface="Roboto Medium" panose="02000000000000000000" pitchFamily="2" charset="0"/>
-            </a:endParaRPr>
-          </a:p>
-        </p:txBody>
-      </p:sp>
-      <p:sp>
-        <p:nvSpPr>
-          <p:cNvPr id="67" name="Rechteck 66">
-            <a:extLst>
-              <a:ext uri="{FF2B5EF4-FFF2-40B4-BE49-F238E27FC236}">
-                <a16:creationId xmlns:a16="http://schemas.microsoft.com/office/drawing/2014/main" id="{1D7A00AE-CB40-437A-9A88-11C904B2A2DE}"/>
-              </a:ext>
-            </a:extLst>
-          </p:cNvPr>
-          <p:cNvSpPr/>
-          <p:nvPr/>
-        </p:nvSpPr>
-        <p:spPr>
-          <a:xfrm>
-            <a:off x="2176193" y="5444415"/>
-            <a:ext cx="1212742" cy="716970"/>
-          </a:xfrm>
-          <a:prstGeom prst="rect">
-            <a:avLst/>
-          </a:prstGeom>
-        </p:spPr>
-        <p:style>
-          <a:lnRef idx="2">
-            <a:schemeClr val="accent3">
-              <a:shade val="50000"/>
-            </a:schemeClr>
-          </a:lnRef>
-          <a:fillRef idx="1">
-            <a:schemeClr val="accent3"/>
-          </a:fillRef>
-          <a:effectRef idx="0">
-            <a:schemeClr val="accent3"/>
-          </a:effectRef>
-          <a:fontRef idx="minor">
-            <a:schemeClr val="lt1"/>
-          </a:fontRef>
-        </p:style>
-        <p:txBody>
-          <a:bodyPr rtlCol="0" anchor="ctr"/>
-          <a:lstStyle/>
-          <a:p>
-            <a:pPr algn="ctr"/>
-            <a:r>
               <a:rPr lang="de-DE" sz="1400">
                 <a:latin typeface="Roboto Medium" panose="02000000000000000000" pitchFamily="2" charset="0"/>
                 <a:ea typeface="Roboto Medium" panose="02000000000000000000" pitchFamily="2" charset="0"/>
               </a:rPr>
-              <a:t>DBManager</a:t>
-            </a:r>
-          </a:p>
-        </p:txBody>
-      </p:sp>
-      <p:cxnSp>
-        <p:nvCxnSpPr>
-          <p:cNvPr id="71" name="Verbinder: gewinkelt 70">
-            <a:extLst>
-              <a:ext uri="{FF2B5EF4-FFF2-40B4-BE49-F238E27FC236}">
-                <a16:creationId xmlns:a16="http://schemas.microsoft.com/office/drawing/2014/main" id="{238E2458-EBDA-4860-8281-03FB6D10CF1E}"/>
-              </a:ext>
-            </a:extLst>
-          </p:cNvPr>
-          <p:cNvCxnSpPr>
-            <a:cxnSpLocks/>
-            <a:stCxn id="22" idx="2"/>
-            <a:endCxn id="67" idx="3"/>
-          </p:cNvCxnSpPr>
-          <p:nvPr/>
-        </p:nvCxnSpPr>
-        <p:spPr>
-          <a:xfrm rot="5400000">
-            <a:off x="3206704" y="4848183"/>
-            <a:ext cx="1136948" cy="772486"/>
-          </a:xfrm>
-          <a:prstGeom prst="bentConnector2">
-            <a:avLst/>
-          </a:prstGeom>
-          <a:ln w="57150">
-            <a:solidFill>
-              <a:srgbClr val="00B0F0"/>
-            </a:solidFill>
-            <a:tailEnd type="triangle"/>
-          </a:ln>
-        </p:spPr>
-        <p:style>
-          <a:lnRef idx="1">
-            <a:schemeClr val="accent1"/>
-          </a:lnRef>
-          <a:fillRef idx="0">
-            <a:schemeClr val="accent1"/>
-          </a:fillRef>
-          <a:effectRef idx="0">
-            <a:schemeClr val="accent1"/>
-          </a:effectRef>
-          <a:fontRef idx="minor">
-            <a:schemeClr val="tx1"/>
-          </a:fontRef>
-        </p:style>
-      </p:cxnSp>
-      <p:sp>
-        <p:nvSpPr>
-          <p:cNvPr id="79" name="Gleichschenkliges Dreieck 78">
-            <a:extLst>
-              <a:ext uri="{FF2B5EF4-FFF2-40B4-BE49-F238E27FC236}">
-                <a16:creationId xmlns:a16="http://schemas.microsoft.com/office/drawing/2014/main" id="{9A26699E-BF04-49E7-808C-8B5AED3524D7}"/>
-              </a:ext>
-            </a:extLst>
-          </p:cNvPr>
-          <p:cNvSpPr/>
-          <p:nvPr/>
-        </p:nvSpPr>
-        <p:spPr>
-          <a:xfrm rot="16200000">
-            <a:off x="-227056" y="3498927"/>
-            <a:ext cx="1853920" cy="869546"/>
-          </a:xfrm>
-          <a:prstGeom prst="triangle">
-            <a:avLst/>
-          </a:prstGeom>
-        </p:spPr>
-        <p:style>
-          <a:lnRef idx="2">
-            <a:schemeClr val="accent2">
-              <a:shade val="50000"/>
-            </a:schemeClr>
-          </a:lnRef>
-          <a:fillRef idx="1">
-            <a:schemeClr val="accent2"/>
-          </a:fillRef>
-          <a:effectRef idx="0">
-            <a:schemeClr val="accent2"/>
-          </a:effectRef>
-          <a:fontRef idx="minor">
-            <a:schemeClr val="lt1"/>
-          </a:fontRef>
-        </p:style>
-        <p:txBody>
-          <a:bodyPr rtlCol="0" anchor="ctr"/>
-          <a:lstStyle/>
-          <a:p>
-            <a:pPr algn="ctr"/>
-            <a:r>
-              <a:rPr lang="de-DE" sz="1400">
-                <a:latin typeface="Roboto Medium" panose="02000000000000000000" pitchFamily="2" charset="0"/>
-                <a:ea typeface="Roboto Medium" panose="02000000000000000000" pitchFamily="2" charset="0"/>
-              </a:rPr>
-              <a:t>Message List</a:t>
-            </a:r>
-          </a:p>
-        </p:txBody>
-      </p:sp>
-      <p:sp>
-        <p:nvSpPr>
-          <p:cNvPr id="80" name="Gleichschenkliges Dreieck 79">
-            <a:extLst>
-              <a:ext uri="{FF2B5EF4-FFF2-40B4-BE49-F238E27FC236}">
-                <a16:creationId xmlns:a16="http://schemas.microsoft.com/office/drawing/2014/main" id="{AA488369-24D7-4D98-8C9A-0AB281F4F80D}"/>
-              </a:ext>
-            </a:extLst>
-          </p:cNvPr>
-          <p:cNvSpPr/>
-          <p:nvPr/>
-        </p:nvSpPr>
-        <p:spPr>
-          <a:xfrm rot="5400000">
-            <a:off x="-222111" y="507726"/>
-            <a:ext cx="1571855" cy="869546"/>
-          </a:xfrm>
-          <a:prstGeom prst="triangle">
-            <a:avLst/>
-          </a:prstGeom>
-        </p:spPr>
-        <p:style>
-          <a:lnRef idx="2">
-            <a:schemeClr val="accent2">
-              <a:shade val="50000"/>
-            </a:schemeClr>
-          </a:lnRef>
-          <a:fillRef idx="1">
-            <a:schemeClr val="accent2"/>
-          </a:fillRef>
-          <a:effectRef idx="0">
-            <a:schemeClr val="accent2"/>
-          </a:effectRef>
-          <a:fontRef idx="minor">
-            <a:schemeClr val="lt1"/>
-          </a:fontRef>
-        </p:style>
-        <p:txBody>
-          <a:bodyPr rtlCol="0" anchor="ctr"/>
-          <a:lstStyle/>
-          <a:p>
-            <a:pPr algn="ctr"/>
-            <a:r>
-              <a:rPr lang="de-DE" sz="1400">
-                <a:latin typeface="Roboto Medium" panose="02000000000000000000" pitchFamily="2" charset="0"/>
-                <a:ea typeface="Roboto Medium" panose="02000000000000000000" pitchFamily="2" charset="0"/>
-              </a:rPr>
-              <a:t>Send</a:t>
-            </a:r>
-          </a:p>
-          <a:p>
-            <a:pPr algn="ctr"/>
-            <a:r>
-              <a:rPr lang="de-DE" sz="1400">
-                <a:latin typeface="Roboto Medium" panose="02000000000000000000" pitchFamily="2" charset="0"/>
-                <a:ea typeface="Roboto Medium" panose="02000000000000000000" pitchFamily="2" charset="0"/>
-              </a:rPr>
-              <a:t>Queue</a:t>
+              <a:t>Message Manager</a:t>
             </a:r>
           </a:p>
         </p:txBody>
@@ -14506,11 +13825,13 @@
         </p:nvCxnSpPr>
         <p:spPr>
           <a:xfrm flipV="1">
-            <a:off x="998590" y="815526"/>
-            <a:ext cx="2302875" cy="126974"/>
+            <a:off x="1168233" y="815526"/>
+            <a:ext cx="2133232" cy="1988523"/>
           </a:xfrm>
           <a:prstGeom prst="bentConnector3">
-            <a:avLst/>
+            <a:avLst>
+              <a:gd name="adj1" fmla="val -1909"/>
+            </a:avLst>
           </a:prstGeom>
           <a:ln w="57150">
             <a:tailEnd type="triangle"/>
@@ -14662,8 +13983,8 @@
         </p:nvSpPr>
         <p:spPr>
           <a:xfrm>
-            <a:off x="7781733" y="6295610"/>
-            <a:ext cx="3614580" cy="390340"/>
+            <a:off x="7942810" y="6295610"/>
+            <a:ext cx="3524937" cy="390340"/>
           </a:xfrm>
           <a:prstGeom prst="rect">
             <a:avLst/>
@@ -14708,62 +14029,6 @@
           </a:p>
         </p:txBody>
       </p:sp>
-      <p:sp>
-        <p:nvSpPr>
-          <p:cNvPr id="17" name="Rechteck 16">
-            <a:extLst>
-              <a:ext uri="{FF2B5EF4-FFF2-40B4-BE49-F238E27FC236}">
-                <a16:creationId xmlns:a16="http://schemas.microsoft.com/office/drawing/2014/main" id="{7F0CDD3D-DC75-44EA-B18F-A3B6D7F55631}"/>
-              </a:ext>
-            </a:extLst>
-          </p:cNvPr>
-          <p:cNvSpPr/>
-          <p:nvPr/>
-        </p:nvSpPr>
-        <p:spPr>
-          <a:xfrm>
-            <a:off x="8456995" y="2347432"/>
-            <a:ext cx="1334598" cy="716970"/>
-          </a:xfrm>
-          <a:prstGeom prst="rect">
-            <a:avLst/>
-          </a:prstGeom>
-        </p:spPr>
-        <p:style>
-          <a:lnRef idx="2">
-            <a:schemeClr val="accent2">
-              <a:shade val="50000"/>
-            </a:schemeClr>
-          </a:lnRef>
-          <a:fillRef idx="1">
-            <a:schemeClr val="accent2"/>
-          </a:fillRef>
-          <a:effectRef idx="0">
-            <a:schemeClr val="accent2"/>
-          </a:effectRef>
-          <a:fontRef idx="minor">
-            <a:schemeClr val="lt1"/>
-          </a:fontRef>
-        </p:style>
-        <p:txBody>
-          <a:bodyPr rtlCol="0" anchor="ctr"/>
-          <a:lstStyle/>
-          <a:p>
-            <a:pPr algn="ctr"/>
-            <a:r>
-              <a:rPr lang="de-DE" sz="1400" err="1">
-                <a:latin typeface="Roboto Medium" panose="02000000000000000000" pitchFamily="2" charset="0"/>
-                <a:ea typeface="Roboto Medium" panose="02000000000000000000" pitchFamily="2" charset="0"/>
-              </a:rPr>
-              <a:t>SendQueue</a:t>
-            </a:r>
-            <a:endParaRPr lang="de-DE" sz="1400">
-              <a:latin typeface="Roboto Medium" panose="02000000000000000000" pitchFamily="2" charset="0"/>
-              <a:ea typeface="Roboto Medium" panose="02000000000000000000" pitchFamily="2" charset="0"/>
-            </a:endParaRPr>
-          </a:p>
-        </p:txBody>
-      </p:sp>
       <p:cxnSp>
         <p:nvCxnSpPr>
           <p:cNvPr id="41" name="Verbinder: gewinkelt 40">
@@ -14775,24 +14040,24 @@
           </p:cNvPr>
           <p:cNvCxnSpPr>
             <a:cxnSpLocks/>
-            <a:stCxn id="42" idx="1"/>
-            <a:endCxn id="79" idx="3"/>
+            <a:stCxn id="67" idx="0"/>
+            <a:endCxn id="80" idx="5"/>
           </p:cNvCxnSpPr>
           <p:nvPr/>
         </p:nvCxnSpPr>
         <p:spPr>
-          <a:xfrm rot="10800000">
-            <a:off x="1134677" y="3933701"/>
-            <a:ext cx="968204" cy="373767"/>
+          <a:xfrm rot="16200000" flipV="1">
+            <a:off x="1028722" y="3690573"/>
+            <a:ext cx="1458581" cy="2049104"/>
           </a:xfrm>
           <a:prstGeom prst="bentConnector3">
             <a:avLst>
-              <a:gd name="adj1" fmla="val 50000"/>
+              <a:gd name="adj1" fmla="val 16066"/>
             </a:avLst>
           </a:prstGeom>
           <a:ln w="57150">
             <a:solidFill>
-              <a:srgbClr val="00B0F0"/>
+              <a:srgbClr val="FFC000"/>
             </a:solidFill>
             <a:tailEnd type="triangle"/>
           </a:ln>
@@ -14823,115 +14088,21 @@
           </p:cNvPr>
           <p:cNvCxnSpPr>
             <a:cxnSpLocks/>
-            <a:stCxn id="21" idx="2"/>
-            <a:endCxn id="22" idx="0"/>
+            <a:stCxn id="80" idx="0"/>
+            <a:endCxn id="22" idx="1"/>
           </p:cNvCxnSpPr>
           <p:nvPr/>
         </p:nvCxnSpPr>
         <p:spPr>
-          <a:xfrm rot="16200000" flipH="1">
-            <a:off x="3345345" y="3132906"/>
-            <a:ext cx="606814" cy="1025337"/>
-          </a:xfrm>
-          <a:prstGeom prst="bentConnector3">
+          <a:xfrm>
+            <a:off x="1168233" y="2804049"/>
+            <a:ext cx="934648" cy="1087838"/>
+          </a:xfrm>
+          <a:prstGeom prst="bentConnector5">
             <a:avLst>
-              <a:gd name="adj1" fmla="val 50000"/>
-            </a:avLst>
-          </a:prstGeom>
-          <a:ln w="57150">
-            <a:solidFill>
-              <a:srgbClr val="FFC000"/>
-            </a:solidFill>
-            <a:tailEnd type="triangle"/>
-          </a:ln>
-        </p:spPr>
-        <p:style>
-          <a:lnRef idx="1">
-            <a:schemeClr val="accent1"/>
-          </a:lnRef>
-          <a:fillRef idx="0">
-            <a:schemeClr val="accent1"/>
-          </a:fillRef>
-          <a:effectRef idx="0">
-            <a:schemeClr val="accent1"/>
-          </a:effectRef>
-          <a:fontRef idx="minor">
-            <a:schemeClr val="tx1"/>
-          </a:fontRef>
-        </p:style>
-      </p:cxnSp>
-      <p:cxnSp>
-        <p:nvCxnSpPr>
-          <p:cNvPr id="49" name="Verbinder: gewinkelt 48">
-            <a:extLst>
-              <a:ext uri="{FF2B5EF4-FFF2-40B4-BE49-F238E27FC236}">
-                <a16:creationId xmlns:a16="http://schemas.microsoft.com/office/drawing/2014/main" id="{2FC944CD-80E4-4BFE-98A5-1D44E11D7C7F}"/>
-              </a:ext>
-            </a:extLst>
-          </p:cNvPr>
-          <p:cNvCxnSpPr>
-            <a:cxnSpLocks/>
-            <a:stCxn id="67" idx="0"/>
-            <a:endCxn id="42" idx="2"/>
-          </p:cNvCxnSpPr>
-          <p:nvPr/>
-        </p:nvCxnSpPr>
-        <p:spPr>
-          <a:xfrm rot="16200000" flipV="1">
-            <a:off x="2387807" y="5049658"/>
-            <a:ext cx="778463" cy="11052"/>
-          </a:xfrm>
-          <a:prstGeom prst="bentConnector3">
-            <a:avLst>
-              <a:gd name="adj1" fmla="val 50000"/>
-            </a:avLst>
-          </a:prstGeom>
-          <a:ln w="57150">
-            <a:solidFill>
-              <a:srgbClr val="FFC000"/>
-            </a:solidFill>
-            <a:tailEnd type="triangle"/>
-          </a:ln>
-        </p:spPr>
-        <p:style>
-          <a:lnRef idx="1">
-            <a:schemeClr val="accent1"/>
-          </a:lnRef>
-          <a:fillRef idx="0">
-            <a:schemeClr val="accent1"/>
-          </a:fillRef>
-          <a:effectRef idx="0">
-            <a:schemeClr val="accent1"/>
-          </a:effectRef>
-          <a:fontRef idx="minor">
-            <a:schemeClr val="tx1"/>
-          </a:fontRef>
-        </p:style>
-      </p:cxnSp>
-      <p:cxnSp>
-        <p:nvCxnSpPr>
-          <p:cNvPr id="52" name="Verbinder: gewinkelt 51">
-            <a:extLst>
-              <a:ext uri="{FF2B5EF4-FFF2-40B4-BE49-F238E27FC236}">
-                <a16:creationId xmlns:a16="http://schemas.microsoft.com/office/drawing/2014/main" id="{33EC7136-6B52-4DA1-B624-701A0AC265B9}"/>
-              </a:ext>
-            </a:extLst>
-          </p:cNvPr>
-          <p:cNvCxnSpPr>
-            <a:cxnSpLocks/>
-            <a:stCxn id="17" idx="0"/>
-            <a:endCxn id="16" idx="2"/>
-          </p:cNvCxnSpPr>
-          <p:nvPr/>
-        </p:nvCxnSpPr>
-        <p:spPr>
-          <a:xfrm rot="16200000" flipV="1">
-            <a:off x="8992173" y="2215310"/>
-            <a:ext cx="260519" cy="3725"/>
-          </a:xfrm>
-          <a:prstGeom prst="bentConnector3">
-            <a:avLst>
-              <a:gd name="adj1" fmla="val 50000"/>
+              <a:gd name="adj1" fmla="val 24458"/>
+              <a:gd name="adj2" fmla="val 100402"/>
+              <a:gd name="adj3" fmla="val 75542"/>
             </a:avLst>
           </a:prstGeom>
           <a:ln w="57150">
@@ -15003,7 +14174,7 @@
                 <a:latin typeface="Roboto Medium" panose="02000000000000000000" pitchFamily="2" charset="0"/>
                 <a:ea typeface="Roboto Medium" panose="02000000000000000000" pitchFamily="2" charset="0"/>
               </a:rPr>
-              <a:t>Datenbank</a:t>
+              <a:t>Database</a:t>
             </a:r>
           </a:p>
         </p:txBody>
@@ -15056,10 +14227,10 @@
       </p:cxnSp>
       <p:sp>
         <p:nvSpPr>
-          <p:cNvPr id="85" name="Textfeld 84">
-            <a:extLst>
-              <a:ext uri="{FF2B5EF4-FFF2-40B4-BE49-F238E27FC236}">
-                <a16:creationId xmlns:a16="http://schemas.microsoft.com/office/drawing/2014/main" id="{53F8C80B-6849-46DF-9D8E-0A2054CCA22C}"/>
+          <p:cNvPr id="92" name="Textfeld 91">
+            <a:extLst>
+              <a:ext uri="{FF2B5EF4-FFF2-40B4-BE49-F238E27FC236}">
+                <a16:creationId xmlns:a16="http://schemas.microsoft.com/office/drawing/2014/main" id="{3FE3F05E-91D0-4D6B-BBD9-606FAE42BC0D}"/>
               </a:ext>
             </a:extLst>
           </p:cNvPr>
@@ -15068,7 +14239,7 @@
         </p:nvSpPr>
         <p:spPr>
           <a:xfrm>
-            <a:off x="134987" y="446146"/>
+            <a:off x="9171006" y="432765"/>
             <a:ext cx="3078489" cy="338554"/>
           </a:xfrm>
           <a:prstGeom prst="rect">
@@ -15108,7 +14279,7 @@
                 <a:latin typeface="Roboto Medium" panose="02000000000000000000" pitchFamily="2" charset="0"/>
                 <a:ea typeface="Roboto Medium" panose="02000000000000000000" pitchFamily="2" charset="0"/>
               </a:rPr>
-              <a:t>Poll Message</a:t>
+              <a:t>Add message</a:t>
             </a:r>
             <a:endParaRPr lang="de-DE">
               <a:solidFill>
@@ -15132,10 +14303,10 @@
       </p:sp>
       <p:sp>
         <p:nvSpPr>
-          <p:cNvPr id="88" name="Textfeld 87">
-            <a:extLst>
-              <a:ext uri="{FF2B5EF4-FFF2-40B4-BE49-F238E27FC236}">
-                <a16:creationId xmlns:a16="http://schemas.microsoft.com/office/drawing/2014/main" id="{A35D1D7C-38D4-43B3-ACB8-936D11F238B6}"/>
+          <p:cNvPr id="93" name="Textfeld 92">
+            <a:extLst>
+              <a:ext uri="{FF2B5EF4-FFF2-40B4-BE49-F238E27FC236}">
+                <a16:creationId xmlns:a16="http://schemas.microsoft.com/office/drawing/2014/main" id="{C14DD65A-6327-4867-B0F1-B4EC1B58F7B0}"/>
               </a:ext>
             </a:extLst>
           </p:cNvPr>
@@ -15144,160 +14315,8 @@
         </p:nvSpPr>
         <p:spPr>
           <a:xfrm>
-            <a:off x="2853656" y="3226200"/>
-            <a:ext cx="3078489" cy="338554"/>
-          </a:xfrm>
-          <a:prstGeom prst="rect">
-            <a:avLst/>
-          </a:prstGeom>
-          <a:noFill/>
-          <a:effectLst>
-            <a:outerShdw blurRad="63500" sx="102000" sy="102000" algn="ctr" rotWithShape="0">
-              <a:prstClr val="black">
-                <a:alpha val="40000"/>
-              </a:prstClr>
-            </a:outerShdw>
-          </a:effectLst>
-        </p:spPr>
-        <p:txBody>
-          <a:bodyPr wrap="square" rtlCol="0" anchor="ctr">
-            <a:spAutoFit/>
-          </a:bodyPr>
-          <a:lstStyle/>
-          <a:p>
-            <a:pPr algn="ctr"/>
-            <a:r>
-              <a:rPr lang="de-DE" sz="1600">
-                <a:solidFill>
-                  <a:schemeClr val="tx1">
-                    <a:lumMod val="95000"/>
-                    <a:lumOff val="5000"/>
-                  </a:schemeClr>
-                </a:solidFill>
-                <a:effectLst>
-                  <a:outerShdw blurRad="38100" dist="38100" dir="2700000" algn="tl">
-                    <a:srgbClr val="000000">
-                      <a:alpha val="43137"/>
-                    </a:srgbClr>
-                  </a:outerShdw>
-                </a:effectLst>
-                <a:latin typeface="Roboto Medium" panose="02000000000000000000" pitchFamily="2" charset="0"/>
-                <a:ea typeface="Roboto Medium" panose="02000000000000000000" pitchFamily="2" charset="0"/>
-              </a:rPr>
-              <a:t>Poll message</a:t>
-            </a:r>
-            <a:endParaRPr lang="de-DE">
-              <a:solidFill>
-                <a:schemeClr val="tx1">
-                  <a:lumMod val="95000"/>
-                  <a:lumOff val="5000"/>
-                </a:schemeClr>
-              </a:solidFill>
-              <a:effectLst>
-                <a:outerShdw blurRad="38100" dist="38100" dir="2700000" algn="tl">
-                  <a:srgbClr val="000000">
-                    <a:alpha val="43137"/>
-                  </a:srgbClr>
-                </a:outerShdw>
-              </a:effectLst>
-              <a:latin typeface="Roboto Medium" panose="02000000000000000000" pitchFamily="2" charset="0"/>
-              <a:ea typeface="Roboto Medium" panose="02000000000000000000" pitchFamily="2" charset="0"/>
-            </a:endParaRPr>
-          </a:p>
-        </p:txBody>
-      </p:sp>
-      <p:sp>
-        <p:nvSpPr>
-          <p:cNvPr id="92" name="Textfeld 91">
-            <a:extLst>
-              <a:ext uri="{FF2B5EF4-FFF2-40B4-BE49-F238E27FC236}">
-                <a16:creationId xmlns:a16="http://schemas.microsoft.com/office/drawing/2014/main" id="{3FE3F05E-91D0-4D6B-BBD9-606FAE42BC0D}"/>
-              </a:ext>
-            </a:extLst>
-          </p:cNvPr>
-          <p:cNvSpPr txBox="1"/>
-          <p:nvPr/>
-        </p:nvSpPr>
-        <p:spPr>
-          <a:xfrm>
-            <a:off x="6817475" y="2015632"/>
-            <a:ext cx="3078489" cy="338554"/>
-          </a:xfrm>
-          <a:prstGeom prst="rect">
-            <a:avLst/>
-          </a:prstGeom>
-          <a:noFill/>
-          <a:effectLst>
-            <a:outerShdw blurRad="63500" sx="102000" sy="102000" algn="ctr" rotWithShape="0">
-              <a:prstClr val="black">
-                <a:alpha val="40000"/>
-              </a:prstClr>
-            </a:outerShdw>
-          </a:effectLst>
-        </p:spPr>
-        <p:txBody>
-          <a:bodyPr wrap="square" rtlCol="0" anchor="ctr">
-            <a:spAutoFit/>
-          </a:bodyPr>
-          <a:lstStyle/>
-          <a:p>
-            <a:pPr algn="ctr"/>
-            <a:r>
-              <a:rPr lang="de-DE" sz="1600">
-                <a:solidFill>
-                  <a:schemeClr val="tx1">
-                    <a:lumMod val="95000"/>
-                    <a:lumOff val="5000"/>
-                  </a:schemeClr>
-                </a:solidFill>
-                <a:effectLst>
-                  <a:outerShdw blurRad="38100" dist="38100" dir="2700000" algn="tl">
-                    <a:srgbClr val="000000">
-                      <a:alpha val="43137"/>
-                    </a:srgbClr>
-                  </a:outerShdw>
-                </a:effectLst>
-                <a:latin typeface="Roboto Medium" panose="02000000000000000000" pitchFamily="2" charset="0"/>
-                <a:ea typeface="Roboto Medium" panose="02000000000000000000" pitchFamily="2" charset="0"/>
-              </a:rPr>
-              <a:t>Poll message</a:t>
-            </a:r>
-            <a:endParaRPr lang="de-DE">
-              <a:solidFill>
-                <a:schemeClr val="tx1">
-                  <a:lumMod val="95000"/>
-                  <a:lumOff val="5000"/>
-                </a:schemeClr>
-              </a:solidFill>
-              <a:effectLst>
-                <a:outerShdw blurRad="38100" dist="38100" dir="2700000" algn="tl">
-                  <a:srgbClr val="000000">
-                    <a:alpha val="43137"/>
-                  </a:srgbClr>
-                </a:outerShdw>
-              </a:effectLst>
-              <a:latin typeface="Roboto Medium" panose="02000000000000000000" pitchFamily="2" charset="0"/>
-              <a:ea typeface="Roboto Medium" panose="02000000000000000000" pitchFamily="2" charset="0"/>
-            </a:endParaRPr>
-          </a:p>
-        </p:txBody>
-      </p:sp>
-      <p:sp>
-        <p:nvSpPr>
-          <p:cNvPr id="93" name="Textfeld 92">
-            <a:extLst>
-              <a:ext uri="{FF2B5EF4-FFF2-40B4-BE49-F238E27FC236}">
-                <a16:creationId xmlns:a16="http://schemas.microsoft.com/office/drawing/2014/main" id="{C14DD65A-6327-4867-B0F1-B4EC1B58F7B0}"/>
-              </a:ext>
-            </a:extLst>
-          </p:cNvPr>
-          <p:cNvSpPr txBox="1"/>
-          <p:nvPr/>
-        </p:nvSpPr>
-        <p:spPr>
-          <a:xfrm>
-            <a:off x="415938" y="4999244"/>
-            <a:ext cx="3078489" cy="338554"/>
+            <a:off x="-256637" y="4727094"/>
+            <a:ext cx="2693968" cy="584775"/>
           </a:xfrm>
           <a:prstGeom prst="rect">
             <a:avLst/>
@@ -15338,6 +14357,29 @@
               </a:rPr>
               <a:t>Get messages</a:t>
             </a:r>
+          </a:p>
+          <a:p>
+            <a:pPr algn="ctr"/>
+            <a:r>
+              <a:rPr lang="de-DE" sz="1600">
+                <a:solidFill>
+                  <a:schemeClr val="tx1">
+                    <a:lumMod val="95000"/>
+                    <a:lumOff val="5000"/>
+                  </a:schemeClr>
+                </a:solidFill>
+                <a:effectLst>
+                  <a:outerShdw blurRad="38100" dist="38100" dir="2700000" algn="tl">
+                    <a:srgbClr val="000000">
+                      <a:alpha val="43137"/>
+                    </a:srgbClr>
+                  </a:outerShdw>
+                </a:effectLst>
+                <a:latin typeface="Roboto Medium" panose="02000000000000000000" pitchFamily="2" charset="0"/>
+                <a:ea typeface="Roboto Medium" panose="02000000000000000000" pitchFamily="2" charset="0"/>
+              </a:rPr>
+              <a:t>on startup</a:t>
+            </a:r>
             <a:endParaRPr lang="de-DE">
               <a:solidFill>
                 <a:schemeClr val="tx1">
@@ -15372,8 +14414,8 @@
         </p:nvSpPr>
         <p:spPr>
           <a:xfrm>
-            <a:off x="3411439" y="5266412"/>
-            <a:ext cx="3078489" cy="338554"/>
+            <a:off x="2990623" y="5414441"/>
+            <a:ext cx="3078489" cy="584775"/>
           </a:xfrm>
           <a:prstGeom prst="rect">
             <a:avLst/>
@@ -15412,7 +14454,30 @@
                 <a:latin typeface="Roboto Medium" panose="02000000000000000000" pitchFamily="2" charset="0"/>
                 <a:ea typeface="Roboto Medium" panose="02000000000000000000" pitchFamily="2" charset="0"/>
               </a:rPr>
-              <a:t>Add message</a:t>
+              <a:t>Add message to db</a:t>
+            </a:r>
+          </a:p>
+          <a:p>
+            <a:pPr algn="ctr"/>
+            <a:r>
+              <a:rPr lang="de-DE" sz="1600">
+                <a:solidFill>
+                  <a:schemeClr val="tx1">
+                    <a:lumMod val="95000"/>
+                    <a:lumOff val="5000"/>
+                  </a:schemeClr>
+                </a:solidFill>
+                <a:effectLst>
+                  <a:outerShdw blurRad="38100" dist="38100" dir="2700000" algn="tl">
+                    <a:srgbClr val="000000">
+                      <a:alpha val="43137"/>
+                    </a:srgbClr>
+                  </a:outerShdw>
+                </a:effectLst>
+                <a:latin typeface="Roboto Medium" panose="02000000000000000000" pitchFamily="2" charset="0"/>
+                <a:ea typeface="Roboto Medium" panose="02000000000000000000" pitchFamily="2" charset="0"/>
+              </a:rPr>
+              <a:t>Update message in db</a:t>
             </a:r>
             <a:endParaRPr lang="de-DE">
               <a:solidFill>
@@ -15448,7 +14513,7 @@
         </p:nvSpPr>
         <p:spPr>
           <a:xfrm>
-            <a:off x="826308" y="2164676"/>
+            <a:off x="235359" y="461691"/>
             <a:ext cx="3078489" cy="338554"/>
           </a:xfrm>
           <a:prstGeom prst="rect">
@@ -15488,83 +14553,7 @@
                 <a:latin typeface="Roboto Medium" panose="02000000000000000000" pitchFamily="2" charset="0"/>
                 <a:ea typeface="Roboto Medium" panose="02000000000000000000" pitchFamily="2" charset="0"/>
               </a:rPr>
-              <a:t>Add message</a:t>
-            </a:r>
-            <a:endParaRPr lang="de-DE">
-              <a:solidFill>
-                <a:schemeClr val="tx1">
-                  <a:lumMod val="95000"/>
-                  <a:lumOff val="5000"/>
-                </a:schemeClr>
-              </a:solidFill>
-              <a:effectLst>
-                <a:outerShdw blurRad="38100" dist="38100" dir="2700000" algn="tl">
-                  <a:srgbClr val="000000">
-                    <a:alpha val="43137"/>
-                  </a:srgbClr>
-                </a:outerShdw>
-              </a:effectLst>
-              <a:latin typeface="Roboto Medium" panose="02000000000000000000" pitchFamily="2" charset="0"/>
-              <a:ea typeface="Roboto Medium" panose="02000000000000000000" pitchFamily="2" charset="0"/>
-            </a:endParaRPr>
-          </a:p>
-        </p:txBody>
-      </p:sp>
-      <p:sp>
-        <p:nvSpPr>
-          <p:cNvPr id="96" name="Textfeld 95">
-            <a:extLst>
-              <a:ext uri="{FF2B5EF4-FFF2-40B4-BE49-F238E27FC236}">
-                <a16:creationId xmlns:a16="http://schemas.microsoft.com/office/drawing/2014/main" id="{0D8B5E53-8857-487E-97EF-8B9BFD560BD1}"/>
-              </a:ext>
-            </a:extLst>
-          </p:cNvPr>
-          <p:cNvSpPr txBox="1"/>
-          <p:nvPr/>
-        </p:nvSpPr>
-        <p:spPr>
-          <a:xfrm>
-            <a:off x="344511" y="3548776"/>
-            <a:ext cx="3078489" cy="338554"/>
-          </a:xfrm>
-          <a:prstGeom prst="rect">
-            <a:avLst/>
-          </a:prstGeom>
-          <a:noFill/>
-          <a:effectLst>
-            <a:outerShdw blurRad="63500" sx="102000" sy="102000" algn="ctr" rotWithShape="0">
-              <a:prstClr val="black">
-                <a:alpha val="40000"/>
-              </a:prstClr>
-            </a:outerShdw>
-          </a:effectLst>
-        </p:spPr>
-        <p:txBody>
-          <a:bodyPr wrap="square" rtlCol="0" anchor="ctr">
-            <a:spAutoFit/>
-          </a:bodyPr>
-          <a:lstStyle/>
-          <a:p>
-            <a:pPr algn="ctr"/>
-            <a:r>
-              <a:rPr lang="de-DE" sz="1600">
-                <a:solidFill>
-                  <a:schemeClr val="tx1">
-                    <a:lumMod val="95000"/>
-                    <a:lumOff val="5000"/>
-                  </a:schemeClr>
-                </a:solidFill>
-                <a:effectLst>
-                  <a:outerShdw blurRad="38100" dist="38100" dir="2700000" algn="tl">
-                    <a:srgbClr val="000000">
-                      <a:alpha val="43137"/>
-                    </a:srgbClr>
-                  </a:outerShdw>
-                </a:effectLst>
-                <a:latin typeface="Roboto Medium" panose="02000000000000000000" pitchFamily="2" charset="0"/>
-                <a:ea typeface="Roboto Medium" panose="02000000000000000000" pitchFamily="2" charset="0"/>
-              </a:rPr>
-              <a:t>Add message</a:t>
+              <a:t>Get message to send</a:t>
             </a:r>
             <a:endParaRPr lang="de-DE">
               <a:solidFill>
@@ -15662,56 +14651,12 @@
           </a:p>
         </p:txBody>
       </p:sp>
-      <p:cxnSp>
-        <p:nvCxnSpPr>
-          <p:cNvPr id="53" name="Verbinder: gewinkelt 52">
-            <a:extLst>
-              <a:ext uri="{FF2B5EF4-FFF2-40B4-BE49-F238E27FC236}">
-                <a16:creationId xmlns:a16="http://schemas.microsoft.com/office/drawing/2014/main" id="{33B30A11-EBD4-47D4-ACEA-F7D63A8DC574}"/>
-              </a:ext>
-            </a:extLst>
-          </p:cNvPr>
-          <p:cNvCxnSpPr>
-            <a:cxnSpLocks/>
-            <a:endCxn id="80" idx="5"/>
-          </p:cNvCxnSpPr>
-          <p:nvPr/>
-        </p:nvCxnSpPr>
-        <p:spPr>
-          <a:xfrm rot="16200000" flipV="1">
-            <a:off x="173196" y="1726084"/>
-            <a:ext cx="785928" cy="4686"/>
-          </a:xfrm>
-          <a:prstGeom prst="bentConnector3">
-            <a:avLst>
-              <a:gd name="adj1" fmla="val 50000"/>
-            </a:avLst>
-          </a:prstGeom>
-          <a:ln w="57150">
-            <a:tailEnd type="triangle"/>
-          </a:ln>
-        </p:spPr>
-        <p:style>
-          <a:lnRef idx="1">
-            <a:schemeClr val="accent4"/>
-          </a:lnRef>
-          <a:fillRef idx="0">
-            <a:schemeClr val="accent4"/>
-          </a:fillRef>
-          <a:effectRef idx="0">
-            <a:schemeClr val="accent4"/>
-          </a:effectRef>
-          <a:fontRef idx="minor">
-            <a:schemeClr val="tx1"/>
-          </a:fontRef>
-        </p:style>
-      </p:cxnSp>
-      <p:sp>
-        <p:nvSpPr>
-          <p:cNvPr id="54" name="Textfeld 53">
-            <a:extLst>
-              <a:ext uri="{FF2B5EF4-FFF2-40B4-BE49-F238E27FC236}">
-                <a16:creationId xmlns:a16="http://schemas.microsoft.com/office/drawing/2014/main" id="{3579099C-0ACF-46AE-9273-AB5B20CD7A0C}"/>
+      <p:sp>
+        <p:nvSpPr>
+          <p:cNvPr id="98" name="Textfeld 97">
+            <a:extLst>
+              <a:ext uri="{FF2B5EF4-FFF2-40B4-BE49-F238E27FC236}">
+                <a16:creationId xmlns:a16="http://schemas.microsoft.com/office/drawing/2014/main" id="{A66354F0-8ECB-4C37-81BE-1B123F9E3EA2}"/>
               </a:ext>
             </a:extLst>
           </p:cNvPr>
@@ -15720,8 +14665,8 @@
         </p:nvSpPr>
         <p:spPr>
           <a:xfrm>
-            <a:off x="-301056" y="1364921"/>
-            <a:ext cx="3078489" cy="523220"/>
+            <a:off x="5096110" y="181958"/>
+            <a:ext cx="3078489" cy="584775"/>
           </a:xfrm>
           <a:prstGeom prst="rect">
             <a:avLst/>
@@ -15743,7 +14688,7 @@
           <a:p>
             <a:pPr algn="ctr"/>
             <a:r>
-              <a:rPr lang="de-DE" sz="1400">
+              <a:rPr lang="de-DE" sz="1600">
                 <a:solidFill>
                   <a:schemeClr val="tx1">
                     <a:lumMod val="95000"/>
@@ -15760,13 +14705,113 @@
                 <a:latin typeface="Roboto Medium" panose="02000000000000000000" pitchFamily="2" charset="0"/>
                 <a:ea typeface="Roboto Medium" panose="02000000000000000000" pitchFamily="2" charset="0"/>
               </a:rPr>
-              <a:t>Add session id</a:t>
-            </a:r>
-          </a:p>
+              <a:t>Send message with session id, receive answer</a:t>
+            </a:r>
+            <a:endParaRPr lang="de-DE">
+              <a:solidFill>
+                <a:schemeClr val="tx1">
+                  <a:lumMod val="95000"/>
+                  <a:lumOff val="5000"/>
+                </a:schemeClr>
+              </a:solidFill>
+              <a:effectLst>
+                <a:outerShdw blurRad="38100" dist="38100" dir="2700000" algn="tl">
+                  <a:srgbClr val="000000">
+                    <a:alpha val="43137"/>
+                  </a:srgbClr>
+                </a:outerShdw>
+              </a:effectLst>
+              <a:latin typeface="Roboto Medium" panose="02000000000000000000" pitchFamily="2" charset="0"/>
+              <a:ea typeface="Roboto Medium" panose="02000000000000000000" pitchFamily="2" charset="0"/>
+            </a:endParaRPr>
+          </a:p>
+        </p:txBody>
+      </p:sp>
+      <p:cxnSp>
+        <p:nvCxnSpPr>
+          <p:cNvPr id="100" name="Verbinder: gewinkelt 99">
+            <a:extLst>
+              <a:ext uri="{FF2B5EF4-FFF2-40B4-BE49-F238E27FC236}">
+                <a16:creationId xmlns:a16="http://schemas.microsoft.com/office/drawing/2014/main" id="{0D817FF6-11A3-495B-92CC-935A371C683E}"/>
+              </a:ext>
+            </a:extLst>
+          </p:cNvPr>
+          <p:cNvCxnSpPr>
+            <a:cxnSpLocks/>
+          </p:cNvCxnSpPr>
+          <p:nvPr/>
+        </p:nvCxnSpPr>
+        <p:spPr>
+          <a:xfrm flipV="1">
+            <a:off x="4732999" y="831859"/>
+            <a:ext cx="3670050" cy="2328"/>
+          </a:xfrm>
+          <a:prstGeom prst="bentConnector3">
+            <a:avLst>
+              <a:gd name="adj1" fmla="val 50000"/>
+            </a:avLst>
+          </a:prstGeom>
+          <a:ln w="57150">
+            <a:solidFill>
+              <a:srgbClr val="7030A0"/>
+            </a:solidFill>
+            <a:headEnd type="triangle"/>
+            <a:tailEnd type="triangle"/>
+          </a:ln>
+        </p:spPr>
+        <p:style>
+          <a:lnRef idx="1">
+            <a:schemeClr val="accent1"/>
+          </a:lnRef>
+          <a:fillRef idx="0">
+            <a:schemeClr val="accent1"/>
+          </a:fillRef>
+          <a:effectRef idx="0">
+            <a:schemeClr val="accent1"/>
+          </a:effectRef>
+          <a:fontRef idx="minor">
+            <a:schemeClr val="tx1"/>
+          </a:fontRef>
+        </p:style>
+      </p:cxnSp>
+      <p:sp>
+        <p:nvSpPr>
+          <p:cNvPr id="56" name="Textfeld 55">
+            <a:extLst>
+              <a:ext uri="{FF2B5EF4-FFF2-40B4-BE49-F238E27FC236}">
+                <a16:creationId xmlns:a16="http://schemas.microsoft.com/office/drawing/2014/main" id="{8A0CD288-FE51-41FC-98A9-E2567373C928}"/>
+              </a:ext>
+            </a:extLst>
+          </p:cNvPr>
+          <p:cNvSpPr txBox="1"/>
+          <p:nvPr/>
+        </p:nvSpPr>
+        <p:spPr>
+          <a:xfrm>
+            <a:off x="1276724" y="2636623"/>
+            <a:ext cx="3078489" cy="338554"/>
+          </a:xfrm>
+          <a:prstGeom prst="rect">
+            <a:avLst/>
+          </a:prstGeom>
+          <a:noFill/>
+          <a:effectLst>
+            <a:outerShdw blurRad="63500" sx="102000" sy="102000" algn="ctr" rotWithShape="0">
+              <a:prstClr val="black">
+                <a:alpha val="40000"/>
+              </a:prstClr>
+            </a:outerShdw>
+          </a:effectLst>
+        </p:spPr>
+        <p:txBody>
+          <a:bodyPr wrap="square" rtlCol="0" anchor="ctr">
+            <a:spAutoFit/>
+          </a:bodyPr>
+          <a:lstStyle/>
           <a:p>
             <a:pPr algn="ctr"/>
             <a:r>
-              <a:rPr lang="de-DE" sz="1400">
+              <a:rPr lang="de-DE" sz="1600">
                 <a:solidFill>
                   <a:schemeClr val="tx1">
                     <a:lumMod val="95000"/>
@@ -15783,9 +14828,9 @@
                 <a:latin typeface="Roboto Medium" panose="02000000000000000000" pitchFamily="2" charset="0"/>
                 <a:ea typeface="Roboto Medium" panose="02000000000000000000" pitchFamily="2" charset="0"/>
               </a:rPr>
-              <a:t> to message</a:t>
-            </a:r>
-            <a:endParaRPr lang="de-DE" sz="1600">
+              <a:t>Get message to store/update</a:t>
+            </a:r>
+            <a:endParaRPr lang="de-DE">
               <a:solidFill>
                 <a:schemeClr val="tx1">
                   <a:lumMod val="95000"/>
@@ -15805,12 +14850,184 @@
           </a:p>
         </p:txBody>
       </p:sp>
-      <p:sp>
-        <p:nvSpPr>
-          <p:cNvPr id="62" name="Rechteck 61">
-            <a:extLst>
-              <a:ext uri="{FF2B5EF4-FFF2-40B4-BE49-F238E27FC236}">
-                <a16:creationId xmlns:a16="http://schemas.microsoft.com/office/drawing/2014/main" id="{BFA44AFD-DAF4-4FEC-9A57-13F7744961D4}"/>
+      <p:cxnSp>
+        <p:nvCxnSpPr>
+          <p:cNvPr id="60" name="Verbinder: gewinkelt 59">
+            <a:extLst>
+              <a:ext uri="{FF2B5EF4-FFF2-40B4-BE49-F238E27FC236}">
+                <a16:creationId xmlns:a16="http://schemas.microsoft.com/office/drawing/2014/main" id="{643D930E-3F97-4855-AEBC-9CC1A8F682B6}"/>
+              </a:ext>
+            </a:extLst>
+          </p:cNvPr>
+          <p:cNvCxnSpPr>
+            <a:cxnSpLocks/>
+            <a:stCxn id="13" idx="2"/>
+            <a:endCxn id="80" idx="1"/>
+          </p:cNvCxnSpPr>
+          <p:nvPr/>
+        </p:nvCxnSpPr>
+        <p:spPr>
+          <a:xfrm rot="5400000">
+            <a:off x="2159918" y="-252446"/>
+            <a:ext cx="448254" cy="3301169"/>
+          </a:xfrm>
+          <a:prstGeom prst="bentConnector3">
+            <a:avLst>
+              <a:gd name="adj1" fmla="val 20056"/>
+            </a:avLst>
+          </a:prstGeom>
+          <a:ln w="57150">
+            <a:solidFill>
+              <a:srgbClr val="00B0F0"/>
+            </a:solidFill>
+            <a:tailEnd type="triangle"/>
+          </a:ln>
+        </p:spPr>
+        <p:style>
+          <a:lnRef idx="1">
+            <a:schemeClr val="accent1"/>
+          </a:lnRef>
+          <a:fillRef idx="0">
+            <a:schemeClr val="accent1"/>
+          </a:fillRef>
+          <a:effectRef idx="0">
+            <a:schemeClr val="accent1"/>
+          </a:effectRef>
+          <a:fontRef idx="minor">
+            <a:schemeClr val="tx1"/>
+          </a:fontRef>
+        </p:style>
+      </p:cxnSp>
+      <p:cxnSp>
+        <p:nvCxnSpPr>
+          <p:cNvPr id="63" name="Verbinder: gewinkelt 62">
+            <a:extLst>
+              <a:ext uri="{FF2B5EF4-FFF2-40B4-BE49-F238E27FC236}">
+                <a16:creationId xmlns:a16="http://schemas.microsoft.com/office/drawing/2014/main" id="{9835AED9-5E70-4556-9BC9-E46DF64A2039}"/>
+              </a:ext>
+            </a:extLst>
+          </p:cNvPr>
+          <p:cNvCxnSpPr>
+            <a:cxnSpLocks/>
+            <a:stCxn id="14" idx="2"/>
+            <a:endCxn id="80" idx="1"/>
+          </p:cNvCxnSpPr>
+          <p:nvPr/>
+        </p:nvCxnSpPr>
+        <p:spPr>
+          <a:xfrm rot="5400000" flipH="1">
+            <a:off x="2149262" y="206464"/>
+            <a:ext cx="469565" cy="3301169"/>
+          </a:xfrm>
+          <a:prstGeom prst="bentConnector3">
+            <a:avLst>
+              <a:gd name="adj1" fmla="val -23248"/>
+            </a:avLst>
+          </a:prstGeom>
+          <a:ln w="57150">
+            <a:solidFill>
+              <a:srgbClr val="00B0F0"/>
+            </a:solidFill>
+            <a:tailEnd type="triangle"/>
+          </a:ln>
+        </p:spPr>
+        <p:style>
+          <a:lnRef idx="1">
+            <a:schemeClr val="accent1"/>
+          </a:lnRef>
+          <a:fillRef idx="0">
+            <a:schemeClr val="accent1"/>
+          </a:fillRef>
+          <a:effectRef idx="0">
+            <a:schemeClr val="accent1"/>
+          </a:effectRef>
+          <a:fontRef idx="minor">
+            <a:schemeClr val="tx1"/>
+          </a:fontRef>
+        </p:style>
+      </p:cxnSp>
+      <p:sp>
+        <p:nvSpPr>
+          <p:cNvPr id="70" name="Textfeld 69">
+            <a:extLst>
+              <a:ext uri="{FF2B5EF4-FFF2-40B4-BE49-F238E27FC236}">
+                <a16:creationId xmlns:a16="http://schemas.microsoft.com/office/drawing/2014/main" id="{5F992E79-1467-4F3F-AF65-E8563308527E}"/>
+              </a:ext>
+            </a:extLst>
+          </p:cNvPr>
+          <p:cNvSpPr txBox="1"/>
+          <p:nvPr/>
+        </p:nvSpPr>
+        <p:spPr>
+          <a:xfrm>
+            <a:off x="454708" y="1531118"/>
+            <a:ext cx="3078489" cy="338554"/>
+          </a:xfrm>
+          <a:prstGeom prst="rect">
+            <a:avLst/>
+          </a:prstGeom>
+          <a:noFill/>
+          <a:effectLst>
+            <a:outerShdw blurRad="63500" sx="102000" sy="102000" algn="ctr" rotWithShape="0">
+              <a:prstClr val="black">
+                <a:alpha val="40000"/>
+              </a:prstClr>
+            </a:outerShdw>
+          </a:effectLst>
+        </p:spPr>
+        <p:txBody>
+          <a:bodyPr wrap="square" rtlCol="0" anchor="ctr">
+            <a:spAutoFit/>
+          </a:bodyPr>
+          <a:lstStyle/>
+          <a:p>
+            <a:pPr algn="ctr"/>
+            <a:r>
+              <a:rPr lang="de-DE" sz="1600">
+                <a:solidFill>
+                  <a:schemeClr val="tx1">
+                    <a:lumMod val="95000"/>
+                    <a:lumOff val="5000"/>
+                  </a:schemeClr>
+                </a:solidFill>
+                <a:effectLst>
+                  <a:outerShdw blurRad="38100" dist="38100" dir="2700000" algn="tl">
+                    <a:srgbClr val="000000">
+                      <a:alpha val="43137"/>
+                    </a:srgbClr>
+                  </a:outerShdw>
+                </a:effectLst>
+                <a:latin typeface="Roboto Medium" panose="02000000000000000000" pitchFamily="2" charset="0"/>
+                <a:ea typeface="Roboto Medium" panose="02000000000000000000" pitchFamily="2" charset="0"/>
+              </a:rPr>
+              <a:t>Add / Change messages</a:t>
+            </a:r>
+            <a:endParaRPr lang="de-DE">
+              <a:solidFill>
+                <a:schemeClr val="tx1">
+                  <a:lumMod val="95000"/>
+                  <a:lumOff val="5000"/>
+                </a:schemeClr>
+              </a:solidFill>
+              <a:effectLst>
+                <a:outerShdw blurRad="38100" dist="38100" dir="2700000" algn="tl">
+                  <a:srgbClr val="000000">
+                    <a:alpha val="43137"/>
+                  </a:srgbClr>
+                </a:outerShdw>
+              </a:effectLst>
+              <a:latin typeface="Roboto Medium" panose="02000000000000000000" pitchFamily="2" charset="0"/>
+              <a:ea typeface="Roboto Medium" panose="02000000000000000000" pitchFamily="2" charset="0"/>
+            </a:endParaRPr>
+          </a:p>
+        </p:txBody>
+      </p:sp>
+      <p:sp>
+        <p:nvSpPr>
+          <p:cNvPr id="59" name="Rechteck 58">
+            <a:extLst>
+              <a:ext uri="{FF2B5EF4-FFF2-40B4-BE49-F238E27FC236}">
+                <a16:creationId xmlns:a16="http://schemas.microsoft.com/office/drawing/2014/main" id="{A0CE80C2-3881-41A3-9BEA-2F0108942D37}"/>
               </a:ext>
             </a:extLst>
           </p:cNvPr>
@@ -15819,8 +15036,8 @@
         </p:nvSpPr>
         <p:spPr>
           <a:xfrm>
-            <a:off x="9682174" y="3255788"/>
-            <a:ext cx="1716863" cy="537812"/>
+            <a:off x="8317817" y="343948"/>
+            <a:ext cx="3078496" cy="2293838"/>
           </a:xfrm>
           <a:prstGeom prst="rect">
             <a:avLst/>
@@ -15863,10 +15080,10 @@
       </p:sp>
       <p:sp>
         <p:nvSpPr>
-          <p:cNvPr id="69" name="Rechteck 68">
-            <a:extLst>
-              <a:ext uri="{FF2B5EF4-FFF2-40B4-BE49-F238E27FC236}">
-                <a16:creationId xmlns:a16="http://schemas.microsoft.com/office/drawing/2014/main" id="{546CE8B4-3775-4112-A479-E3776732CDF0}"/>
+          <p:cNvPr id="61" name="Rechteck 60">
+            <a:extLst>
+              <a:ext uri="{FF2B5EF4-FFF2-40B4-BE49-F238E27FC236}">
+                <a16:creationId xmlns:a16="http://schemas.microsoft.com/office/drawing/2014/main" id="{14295798-B1C1-4820-976C-9B11D758D1C4}"/>
               </a:ext>
             </a:extLst>
           </p:cNvPr>
@@ -15875,8 +15092,120 @@
         </p:nvSpPr>
         <p:spPr>
           <a:xfrm>
-            <a:off x="9874608" y="2925908"/>
-            <a:ext cx="1386909" cy="716970"/>
+            <a:off x="8437843" y="442817"/>
+            <a:ext cx="1466326" cy="740762"/>
+          </a:xfrm>
+          <a:prstGeom prst="rect">
+            <a:avLst/>
+          </a:prstGeom>
+        </p:spPr>
+        <p:style>
+          <a:lnRef idx="2">
+            <a:schemeClr val="accent6">
+              <a:shade val="50000"/>
+            </a:schemeClr>
+          </a:lnRef>
+          <a:fillRef idx="1">
+            <a:schemeClr val="accent6"/>
+          </a:fillRef>
+          <a:effectRef idx="0">
+            <a:schemeClr val="accent6"/>
+          </a:effectRef>
+          <a:fontRef idx="minor">
+            <a:schemeClr val="lt1"/>
+          </a:fontRef>
+        </p:style>
+        <p:txBody>
+          <a:bodyPr rtlCol="0" anchor="ctr"/>
+          <a:lstStyle/>
+          <a:p>
+            <a:pPr algn="ctr"/>
+            <a:r>
+              <a:rPr lang="de-DE" sz="1400" err="1">
+                <a:latin typeface="Roboto Medium" panose="02000000000000000000" pitchFamily="2" charset="0"/>
+                <a:ea typeface="Roboto Medium" panose="02000000000000000000" pitchFamily="2" charset="0"/>
+              </a:rPr>
+              <a:t>ReceiveService</a:t>
+            </a:r>
+            <a:endParaRPr lang="de-DE" sz="1400">
+              <a:latin typeface="Roboto Medium" panose="02000000000000000000" pitchFamily="2" charset="0"/>
+              <a:ea typeface="Roboto Medium" panose="02000000000000000000" pitchFamily="2" charset="0"/>
+            </a:endParaRPr>
+          </a:p>
+        </p:txBody>
+      </p:sp>
+      <p:sp>
+        <p:nvSpPr>
+          <p:cNvPr id="62" name="Rechteck 61">
+            <a:extLst>
+              <a:ext uri="{FF2B5EF4-FFF2-40B4-BE49-F238E27FC236}">
+                <a16:creationId xmlns:a16="http://schemas.microsoft.com/office/drawing/2014/main" id="{5022402D-3B17-4EAF-B697-1346084E1711}"/>
+              </a:ext>
+            </a:extLst>
+          </p:cNvPr>
+          <p:cNvSpPr/>
+          <p:nvPr/>
+        </p:nvSpPr>
+        <p:spPr>
+          <a:xfrm>
+            <a:off x="8456995" y="1369943"/>
+            <a:ext cx="1327148" cy="716970"/>
+          </a:xfrm>
+          <a:prstGeom prst="rect">
+            <a:avLst/>
+          </a:prstGeom>
+        </p:spPr>
+        <p:style>
+          <a:lnRef idx="2">
+            <a:schemeClr val="accent6">
+              <a:shade val="50000"/>
+            </a:schemeClr>
+          </a:lnRef>
+          <a:fillRef idx="1">
+            <a:schemeClr val="accent6"/>
+          </a:fillRef>
+          <a:effectRef idx="0">
+            <a:schemeClr val="accent6"/>
+          </a:effectRef>
+          <a:fontRef idx="minor">
+            <a:schemeClr val="lt1"/>
+          </a:fontRef>
+        </p:style>
+        <p:txBody>
+          <a:bodyPr rtlCol="0" anchor="ctr"/>
+          <a:lstStyle/>
+          <a:p>
+            <a:pPr algn="ctr"/>
+            <a:r>
+              <a:rPr lang="de-DE" sz="1400" err="1">
+                <a:latin typeface="Roboto Medium" panose="02000000000000000000" pitchFamily="2" charset="0"/>
+                <a:ea typeface="Roboto Medium" panose="02000000000000000000" pitchFamily="2" charset="0"/>
+              </a:rPr>
+              <a:t>SendService</a:t>
+            </a:r>
+            <a:endParaRPr lang="de-DE" sz="1400">
+              <a:latin typeface="Roboto Medium" panose="02000000000000000000" pitchFamily="2" charset="0"/>
+              <a:ea typeface="Roboto Medium" panose="02000000000000000000" pitchFamily="2" charset="0"/>
+            </a:endParaRPr>
+          </a:p>
+        </p:txBody>
+      </p:sp>
+      <p:sp>
+        <p:nvSpPr>
+          <p:cNvPr id="64" name="Rechteck 63">
+            <a:extLst>
+              <a:ext uri="{FF2B5EF4-FFF2-40B4-BE49-F238E27FC236}">
+                <a16:creationId xmlns:a16="http://schemas.microsoft.com/office/drawing/2014/main" id="{1B052F83-23B1-4DBF-96D0-94CC37C808BC}"/>
+              </a:ext>
+            </a:extLst>
+          </p:cNvPr>
+          <p:cNvSpPr/>
+          <p:nvPr/>
+        </p:nvSpPr>
+        <p:spPr>
+          <a:xfrm>
+            <a:off x="8456995" y="2347432"/>
+            <a:ext cx="1334598" cy="716970"/>
           </a:xfrm>
           <a:prstGeom prst="rect">
             <a:avLst/>
@@ -15908,40 +15237,41 @@
                 <a:latin typeface="Roboto Medium" panose="02000000000000000000" pitchFamily="2" charset="0"/>
                 <a:ea typeface="Roboto Medium" panose="02000000000000000000" pitchFamily="2" charset="0"/>
               </a:rPr>
-              <a:t>SessionList</a:t>
+              <a:t>Message Manager</a:t>
             </a:r>
           </a:p>
         </p:txBody>
       </p:sp>
       <p:cxnSp>
         <p:nvCxnSpPr>
-          <p:cNvPr id="81" name="Verbinder: gewinkelt 80">
-            <a:extLst>
-              <a:ext uri="{FF2B5EF4-FFF2-40B4-BE49-F238E27FC236}">
-                <a16:creationId xmlns:a16="http://schemas.microsoft.com/office/drawing/2014/main" id="{C434210C-9EFF-4EDC-B925-A80AFD69AAB9}"/>
+          <p:cNvPr id="65" name="Verbinder: gewinkelt 64">
+            <a:extLst>
+              <a:ext uri="{FF2B5EF4-FFF2-40B4-BE49-F238E27FC236}">
+                <a16:creationId xmlns:a16="http://schemas.microsoft.com/office/drawing/2014/main" id="{45CBBD5F-C17E-4520-B3F3-42C807186540}"/>
               </a:ext>
             </a:extLst>
           </p:cNvPr>
           <p:cNvCxnSpPr>
             <a:cxnSpLocks/>
-            <a:stCxn id="15" idx="3"/>
-            <a:endCxn id="69" idx="0"/>
+            <a:stCxn id="64" idx="0"/>
+            <a:endCxn id="62" idx="2"/>
           </p:cNvCxnSpPr>
           <p:nvPr/>
         </p:nvCxnSpPr>
         <p:spPr>
-          <a:xfrm>
-            <a:off x="9904169" y="813198"/>
-            <a:ext cx="663894" cy="2112710"/>
-          </a:xfrm>
-          <a:prstGeom prst="bentConnector2">
-            <a:avLst/>
+          <a:xfrm rot="16200000" flipV="1">
+            <a:off x="8992173" y="2215310"/>
+            <a:ext cx="260519" cy="3725"/>
+          </a:xfrm>
+          <a:prstGeom prst="bentConnector3">
+            <a:avLst>
+              <a:gd name="adj1" fmla="val 50000"/>
+            </a:avLst>
           </a:prstGeom>
           <a:ln w="57150">
             <a:solidFill>
-              <a:srgbClr val="7030A0"/>
+              <a:srgbClr val="FFC000"/>
             </a:solidFill>
-            <a:headEnd type="triangle"/>
             <a:tailEnd type="triangle"/>
           </a:ln>
         </p:spPr>
@@ -15962,10 +15292,288 @@
       </p:cxnSp>
       <p:sp>
         <p:nvSpPr>
-          <p:cNvPr id="84" name="Textfeld 83">
-            <a:extLst>
-              <a:ext uri="{FF2B5EF4-FFF2-40B4-BE49-F238E27FC236}">
-                <a16:creationId xmlns:a16="http://schemas.microsoft.com/office/drawing/2014/main" id="{CC50F31D-5D41-4501-901A-CF7EA8660B17}"/>
+          <p:cNvPr id="66" name="Rechteck 65">
+            <a:extLst>
+              <a:ext uri="{FF2B5EF4-FFF2-40B4-BE49-F238E27FC236}">
+                <a16:creationId xmlns:a16="http://schemas.microsoft.com/office/drawing/2014/main" id="{BA2C8A44-F24E-4A9D-904A-EE9BDAC21285}"/>
+              </a:ext>
+            </a:extLst>
+          </p:cNvPr>
+          <p:cNvSpPr/>
+          <p:nvPr/>
+        </p:nvSpPr>
+        <p:spPr>
+          <a:xfrm>
+            <a:off x="9682174" y="3255788"/>
+            <a:ext cx="1716863" cy="537812"/>
+          </a:xfrm>
+          <a:prstGeom prst="rect">
+            <a:avLst/>
+          </a:prstGeom>
+          <a:effectLst>
+            <a:outerShdw blurRad="266700" sx="102000" sy="102000" algn="ctr" rotWithShape="0">
+              <a:prstClr val="black">
+                <a:alpha val="18000"/>
+              </a:prstClr>
+            </a:outerShdw>
+          </a:effectLst>
+        </p:spPr>
+        <p:style>
+          <a:lnRef idx="2">
+            <a:schemeClr val="accent1">
+              <a:shade val="50000"/>
+            </a:schemeClr>
+          </a:lnRef>
+          <a:fillRef idx="1">
+            <a:schemeClr val="accent1"/>
+          </a:fillRef>
+          <a:effectRef idx="0">
+            <a:schemeClr val="accent1"/>
+          </a:effectRef>
+          <a:fontRef idx="minor">
+            <a:schemeClr val="lt1"/>
+          </a:fontRef>
+        </p:style>
+        <p:txBody>
+          <a:bodyPr rtlCol="0" anchor="ctr"/>
+          <a:lstStyle/>
+          <a:p>
+            <a:pPr algn="ctr"/>
+            <a:endParaRPr lang="de-DE" sz="1400">
+              <a:latin typeface="Roboto Medium" panose="02000000000000000000" pitchFamily="2" charset="0"/>
+              <a:ea typeface="Roboto Medium" panose="02000000000000000000" pitchFamily="2" charset="0"/>
+            </a:endParaRPr>
+          </a:p>
+        </p:txBody>
+      </p:sp>
+      <p:sp>
+        <p:nvSpPr>
+          <p:cNvPr id="68" name="Rechteck 67">
+            <a:extLst>
+              <a:ext uri="{FF2B5EF4-FFF2-40B4-BE49-F238E27FC236}">
+                <a16:creationId xmlns:a16="http://schemas.microsoft.com/office/drawing/2014/main" id="{E3DFD21D-1F50-4484-984D-2A396F42C0B2}"/>
+              </a:ext>
+            </a:extLst>
+          </p:cNvPr>
+          <p:cNvSpPr/>
+          <p:nvPr/>
+        </p:nvSpPr>
+        <p:spPr>
+          <a:xfrm>
+            <a:off x="9874608" y="2925908"/>
+            <a:ext cx="1386909" cy="716970"/>
+          </a:xfrm>
+          <a:prstGeom prst="rect">
+            <a:avLst/>
+          </a:prstGeom>
+        </p:spPr>
+        <p:style>
+          <a:lnRef idx="2">
+            <a:schemeClr val="accent2">
+              <a:shade val="50000"/>
+            </a:schemeClr>
+          </a:lnRef>
+          <a:fillRef idx="1">
+            <a:schemeClr val="accent2"/>
+          </a:fillRef>
+          <a:effectRef idx="0">
+            <a:schemeClr val="accent2"/>
+          </a:effectRef>
+          <a:fontRef idx="minor">
+            <a:schemeClr val="lt1"/>
+          </a:fontRef>
+        </p:style>
+        <p:txBody>
+          <a:bodyPr rtlCol="0" anchor="ctr"/>
+          <a:lstStyle/>
+          <a:p>
+            <a:pPr algn="ctr"/>
+            <a:r>
+              <a:rPr lang="de-DE" sz="1400">
+                <a:latin typeface="Roboto Medium" panose="02000000000000000000" pitchFamily="2" charset="0"/>
+                <a:ea typeface="Roboto Medium" panose="02000000000000000000" pitchFamily="2" charset="0"/>
+              </a:rPr>
+              <a:t>SessionList</a:t>
+            </a:r>
+          </a:p>
+        </p:txBody>
+      </p:sp>
+      <p:cxnSp>
+        <p:nvCxnSpPr>
+          <p:cNvPr id="69" name="Verbinder: gewinkelt 68">
+            <a:extLst>
+              <a:ext uri="{FF2B5EF4-FFF2-40B4-BE49-F238E27FC236}">
+                <a16:creationId xmlns:a16="http://schemas.microsoft.com/office/drawing/2014/main" id="{6822C2CE-B84F-4764-AB04-F9240E3A2783}"/>
+              </a:ext>
+            </a:extLst>
+          </p:cNvPr>
+          <p:cNvCxnSpPr>
+            <a:cxnSpLocks/>
+            <a:stCxn id="61" idx="3"/>
+            <a:endCxn id="68" idx="0"/>
+          </p:cNvCxnSpPr>
+          <p:nvPr/>
+        </p:nvCxnSpPr>
+        <p:spPr>
+          <a:xfrm>
+            <a:off x="9904169" y="813198"/>
+            <a:ext cx="663894" cy="2112710"/>
+          </a:xfrm>
+          <a:prstGeom prst="bentConnector2">
+            <a:avLst/>
+          </a:prstGeom>
+          <a:ln w="57150">
+            <a:solidFill>
+              <a:srgbClr val="7030A0"/>
+            </a:solidFill>
+            <a:headEnd type="triangle"/>
+            <a:tailEnd type="triangle"/>
+          </a:ln>
+        </p:spPr>
+        <p:style>
+          <a:lnRef idx="1">
+            <a:schemeClr val="accent1"/>
+          </a:lnRef>
+          <a:fillRef idx="0">
+            <a:schemeClr val="accent1"/>
+          </a:fillRef>
+          <a:effectRef idx="0">
+            <a:schemeClr val="accent1"/>
+          </a:effectRef>
+          <a:fontRef idx="minor">
+            <a:schemeClr val="tx1"/>
+          </a:fontRef>
+        </p:style>
+      </p:cxnSp>
+      <p:cxnSp>
+        <p:nvCxnSpPr>
+          <p:cNvPr id="72" name="Verbinder: gewinkelt 71">
+            <a:extLst>
+              <a:ext uri="{FF2B5EF4-FFF2-40B4-BE49-F238E27FC236}">
+                <a16:creationId xmlns:a16="http://schemas.microsoft.com/office/drawing/2014/main" id="{C8E24C3A-FD4F-4A9C-AB11-706DE1A09A5E}"/>
+              </a:ext>
+            </a:extLst>
+          </p:cNvPr>
+          <p:cNvCxnSpPr>
+            <a:cxnSpLocks/>
+            <a:endCxn id="64" idx="3"/>
+          </p:cNvCxnSpPr>
+          <p:nvPr/>
+        </p:nvCxnSpPr>
+        <p:spPr>
+          <a:xfrm rot="10800000" flipV="1">
+            <a:off x="9791593" y="1553625"/>
+            <a:ext cx="753366" cy="1152292"/>
+          </a:xfrm>
+          <a:prstGeom prst="bentConnector3">
+            <a:avLst>
+              <a:gd name="adj1" fmla="val 50000"/>
+            </a:avLst>
+          </a:prstGeom>
+          <a:ln w="57150">
+            <a:solidFill>
+              <a:srgbClr val="00B0F0"/>
+            </a:solidFill>
+            <a:tailEnd type="triangle"/>
+          </a:ln>
+        </p:spPr>
+        <p:style>
+          <a:lnRef idx="1">
+            <a:schemeClr val="accent6"/>
+          </a:lnRef>
+          <a:fillRef idx="0">
+            <a:schemeClr val="accent6"/>
+          </a:fillRef>
+          <a:effectRef idx="0">
+            <a:schemeClr val="accent6"/>
+          </a:effectRef>
+          <a:fontRef idx="minor">
+            <a:schemeClr val="tx1"/>
+          </a:fontRef>
+        </p:style>
+      </p:cxnSp>
+      <p:sp>
+        <p:nvSpPr>
+          <p:cNvPr id="73" name="Textfeld 72">
+            <a:extLst>
+              <a:ext uri="{FF2B5EF4-FFF2-40B4-BE49-F238E27FC236}">
+                <a16:creationId xmlns:a16="http://schemas.microsoft.com/office/drawing/2014/main" id="{1E7268DB-FCC5-4C79-B417-83FC4142F6F1}"/>
+              </a:ext>
+            </a:extLst>
+          </p:cNvPr>
+          <p:cNvSpPr txBox="1"/>
+          <p:nvPr/>
+        </p:nvSpPr>
+        <p:spPr>
+          <a:xfrm>
+            <a:off x="9448378" y="1937567"/>
+            <a:ext cx="1410271" cy="338554"/>
+          </a:xfrm>
+          <a:prstGeom prst="rect">
+            <a:avLst/>
+          </a:prstGeom>
+          <a:noFill/>
+          <a:effectLst>
+            <a:outerShdw blurRad="63500" sx="102000" sy="102000" algn="ctr" rotWithShape="0">
+              <a:prstClr val="black">
+                <a:alpha val="40000"/>
+              </a:prstClr>
+            </a:outerShdw>
+          </a:effectLst>
+        </p:spPr>
+        <p:txBody>
+          <a:bodyPr wrap="square" rtlCol="0" anchor="ctr">
+            <a:spAutoFit/>
+          </a:bodyPr>
+          <a:lstStyle/>
+          <a:p>
+            <a:pPr algn="ctr"/>
+            <a:r>
+              <a:rPr lang="de-DE" sz="1600">
+                <a:solidFill>
+                  <a:schemeClr val="tx1">
+                    <a:lumMod val="95000"/>
+                    <a:lumOff val="5000"/>
+                  </a:schemeClr>
+                </a:solidFill>
+                <a:effectLst>
+                  <a:outerShdw blurRad="38100" dist="38100" dir="2700000" algn="tl">
+                    <a:srgbClr val="000000">
+                      <a:alpha val="43137"/>
+                    </a:srgbClr>
+                  </a:outerShdw>
+                </a:effectLst>
+                <a:latin typeface="Roboto Medium" panose="02000000000000000000" pitchFamily="2" charset="0"/>
+                <a:ea typeface="Roboto Medium" panose="02000000000000000000" pitchFamily="2" charset="0"/>
+              </a:rPr>
+              <a:t>Yes</a:t>
+            </a:r>
+            <a:endParaRPr lang="de-DE">
+              <a:solidFill>
+                <a:schemeClr val="tx1">
+                  <a:lumMod val="95000"/>
+                  <a:lumOff val="5000"/>
+                </a:schemeClr>
+              </a:solidFill>
+              <a:effectLst>
+                <a:outerShdw blurRad="38100" dist="38100" dir="2700000" algn="tl">
+                  <a:srgbClr val="000000">
+                    <a:alpha val="43137"/>
+                  </a:srgbClr>
+                </a:outerShdw>
+              </a:effectLst>
+              <a:latin typeface="Roboto Medium" panose="02000000000000000000" pitchFamily="2" charset="0"/>
+              <a:ea typeface="Roboto Medium" panose="02000000000000000000" pitchFamily="2" charset="0"/>
+            </a:endParaRPr>
+          </a:p>
+        </p:txBody>
+      </p:sp>
+      <p:sp>
+        <p:nvSpPr>
+          <p:cNvPr id="74" name="Textfeld 73">
+            <a:extLst>
+              <a:ext uri="{FF2B5EF4-FFF2-40B4-BE49-F238E27FC236}">
+                <a16:creationId xmlns:a16="http://schemas.microsoft.com/office/drawing/2014/main" id="{3266EC6B-9005-4A0D-9D50-F9993949452C}"/>
               </a:ext>
             </a:extLst>
           </p:cNvPr>
@@ -16059,60 +15667,12 @@
           </a:p>
         </p:txBody>
       </p:sp>
-      <p:cxnSp>
-        <p:nvCxnSpPr>
-          <p:cNvPr id="99" name="Verbinder: gewinkelt 98">
-            <a:extLst>
-              <a:ext uri="{FF2B5EF4-FFF2-40B4-BE49-F238E27FC236}">
-                <a16:creationId xmlns:a16="http://schemas.microsoft.com/office/drawing/2014/main" id="{71075CAE-6BEF-4820-83A9-3164A81F8196}"/>
-              </a:ext>
-            </a:extLst>
-          </p:cNvPr>
-          <p:cNvCxnSpPr>
-            <a:cxnSpLocks/>
-            <a:stCxn id="84" idx="1"/>
-            <a:endCxn id="17" idx="3"/>
-          </p:cNvCxnSpPr>
-          <p:nvPr/>
-        </p:nvCxnSpPr>
-        <p:spPr>
-          <a:xfrm rot="10800000" flipV="1">
-            <a:off x="9791593" y="1553625"/>
-            <a:ext cx="753366" cy="1152292"/>
-          </a:xfrm>
-          <a:prstGeom prst="bentConnector3">
-            <a:avLst>
-              <a:gd name="adj1" fmla="val 50000"/>
-            </a:avLst>
-          </a:prstGeom>
-          <a:ln w="57150">
-            <a:solidFill>
-              <a:srgbClr val="00B0F0"/>
-            </a:solidFill>
-            <a:tailEnd type="triangle"/>
-          </a:ln>
-        </p:spPr>
-        <p:style>
-          <a:lnRef idx="1">
-            <a:schemeClr val="accent6"/>
-          </a:lnRef>
-          <a:fillRef idx="0">
-            <a:schemeClr val="accent6"/>
-          </a:fillRef>
-          <a:effectRef idx="0">
-            <a:schemeClr val="accent6"/>
-          </a:effectRef>
-          <a:fontRef idx="minor">
-            <a:schemeClr val="tx1"/>
-          </a:fontRef>
-        </p:style>
-      </p:cxnSp>
-      <p:sp>
-        <p:nvSpPr>
-          <p:cNvPr id="100" name="Textfeld 99">
-            <a:extLst>
-              <a:ext uri="{FF2B5EF4-FFF2-40B4-BE49-F238E27FC236}">
-                <a16:creationId xmlns:a16="http://schemas.microsoft.com/office/drawing/2014/main" id="{4012F970-6C35-4EF6-913F-E156C1DA690B}"/>
+      <p:sp>
+        <p:nvSpPr>
+          <p:cNvPr id="75" name="Textfeld 74">
+            <a:extLst>
+              <a:ext uri="{FF2B5EF4-FFF2-40B4-BE49-F238E27FC236}">
+                <a16:creationId xmlns:a16="http://schemas.microsoft.com/office/drawing/2014/main" id="{3CA83CDF-5642-42B8-9B77-CB8B18CD4B0D}"/>
               </a:ext>
             </a:extLst>
           </p:cNvPr>
@@ -16121,8 +15681,8 @@
         </p:nvSpPr>
         <p:spPr>
           <a:xfrm>
-            <a:off x="9448378" y="1937567"/>
-            <a:ext cx="1410271" cy="338554"/>
+            <a:off x="6908596" y="2059310"/>
+            <a:ext cx="3078489" cy="276999"/>
           </a:xfrm>
           <a:prstGeom prst="rect">
             <a:avLst/>
@@ -16144,7 +15704,7 @@
           <a:p>
             <a:pPr algn="ctr"/>
             <a:r>
-              <a:rPr lang="de-DE" sz="1600">
+              <a:rPr lang="de-DE" sz="1200">
                 <a:solidFill>
                   <a:schemeClr val="tx1">
                     <a:lumMod val="95000"/>
@@ -16161,9 +15721,9 @@
                 <a:latin typeface="Roboto Medium" panose="02000000000000000000" pitchFamily="2" charset="0"/>
                 <a:ea typeface="Roboto Medium" panose="02000000000000000000" pitchFamily="2" charset="0"/>
               </a:rPr>
-              <a:t>Yes</a:t>
-            </a:r>
-            <a:endParaRPr lang="de-DE">
+              <a:t>Poll messages to send to client(id)</a:t>
+            </a:r>
+            <a:endParaRPr lang="de-DE" sz="1400">
               <a:solidFill>
                 <a:schemeClr val="tx1">
                   <a:lumMod val="95000"/>
@@ -16183,185 +15743,10 @@
           </a:p>
         </p:txBody>
       </p:sp>
-      <p:sp>
-        <p:nvSpPr>
-          <p:cNvPr id="101" name="Rechteck 100">
-            <a:extLst>
-              <a:ext uri="{FF2B5EF4-FFF2-40B4-BE49-F238E27FC236}">
-                <a16:creationId xmlns:a16="http://schemas.microsoft.com/office/drawing/2014/main" id="{CF6A6736-1A45-48F1-9F99-8035266F4C22}"/>
-              </a:ext>
-            </a:extLst>
-          </p:cNvPr>
-          <p:cNvSpPr/>
-          <p:nvPr/>
-        </p:nvSpPr>
-        <p:spPr>
-          <a:xfrm>
-            <a:off x="114834" y="2027338"/>
-            <a:ext cx="1238987" cy="716970"/>
-          </a:xfrm>
-          <a:prstGeom prst="rect">
-            <a:avLst/>
-          </a:prstGeom>
-        </p:spPr>
-        <p:style>
-          <a:lnRef idx="2">
-            <a:schemeClr val="accent2">
-              <a:shade val="50000"/>
-            </a:schemeClr>
-          </a:lnRef>
-          <a:fillRef idx="1">
-            <a:schemeClr val="accent2"/>
-          </a:fillRef>
-          <a:effectRef idx="0">
-            <a:schemeClr val="accent2"/>
-          </a:effectRef>
-          <a:fontRef idx="minor">
-            <a:schemeClr val="lt1"/>
-          </a:fontRef>
-        </p:style>
-        <p:txBody>
-          <a:bodyPr rtlCol="0" anchor="ctr"/>
-          <a:lstStyle/>
-          <a:p>
-            <a:pPr algn="ctr"/>
-            <a:r>
-              <a:rPr lang="de-DE" sz="1400">
-                <a:latin typeface="Roboto Medium" panose="02000000000000000000" pitchFamily="2" charset="0"/>
-                <a:ea typeface="Roboto Medium" panose="02000000000000000000" pitchFamily="2" charset="0"/>
-              </a:rPr>
-              <a:t>User Data</a:t>
-            </a:r>
-          </a:p>
-        </p:txBody>
-      </p:sp>
-      <p:sp>
-        <p:nvSpPr>
-          <p:cNvPr id="102" name="Textfeld 101">
-            <a:extLst>
-              <a:ext uri="{FF2B5EF4-FFF2-40B4-BE49-F238E27FC236}">
-                <a16:creationId xmlns:a16="http://schemas.microsoft.com/office/drawing/2014/main" id="{12976179-035B-4FB8-ABC5-E0EA50A2D529}"/>
-              </a:ext>
-            </a:extLst>
-          </p:cNvPr>
-          <p:cNvSpPr txBox="1"/>
-          <p:nvPr/>
-        </p:nvSpPr>
-        <p:spPr>
-          <a:xfrm>
-            <a:off x="4950683" y="418627"/>
-            <a:ext cx="3078489" cy="338554"/>
-          </a:xfrm>
-          <a:prstGeom prst="rect">
-            <a:avLst/>
-          </a:prstGeom>
-          <a:noFill/>
-          <a:effectLst>
-            <a:outerShdw blurRad="63500" sx="102000" sy="102000" algn="ctr" rotWithShape="0">
-              <a:prstClr val="black">
-                <a:alpha val="40000"/>
-              </a:prstClr>
-            </a:outerShdw>
-          </a:effectLst>
-        </p:spPr>
-        <p:txBody>
-          <a:bodyPr wrap="square" rtlCol="0" anchor="ctr">
-            <a:spAutoFit/>
-          </a:bodyPr>
-          <a:lstStyle/>
-          <a:p>
-            <a:pPr algn="ctr"/>
-            <a:r>
-              <a:rPr lang="de-DE" sz="1600">
-                <a:solidFill>
-                  <a:schemeClr val="tx1">
-                    <a:lumMod val="95000"/>
-                    <a:lumOff val="5000"/>
-                  </a:schemeClr>
-                </a:solidFill>
-                <a:effectLst>
-                  <a:outerShdw blurRad="38100" dist="38100" dir="2700000" algn="tl">
-                    <a:srgbClr val="000000">
-                      <a:alpha val="43137"/>
-                    </a:srgbClr>
-                  </a:outerShdw>
-                </a:effectLst>
-                <a:latin typeface="Roboto Medium" panose="02000000000000000000" pitchFamily="2" charset="0"/>
-                <a:ea typeface="Roboto Medium" panose="02000000000000000000" pitchFamily="2" charset="0"/>
-              </a:rPr>
-              <a:t>Send message, receive answer</a:t>
-            </a:r>
-            <a:endParaRPr lang="de-DE">
-              <a:solidFill>
-                <a:schemeClr val="tx1">
-                  <a:lumMod val="95000"/>
-                  <a:lumOff val="5000"/>
-                </a:schemeClr>
-              </a:solidFill>
-              <a:effectLst>
-                <a:outerShdw blurRad="38100" dist="38100" dir="2700000" algn="tl">
-                  <a:srgbClr val="000000">
-                    <a:alpha val="43137"/>
-                  </a:srgbClr>
-                </a:outerShdw>
-              </a:effectLst>
-              <a:latin typeface="Roboto Medium" panose="02000000000000000000" pitchFamily="2" charset="0"/>
-              <a:ea typeface="Roboto Medium" panose="02000000000000000000" pitchFamily="2" charset="0"/>
-            </a:endParaRPr>
-          </a:p>
-        </p:txBody>
-      </p:sp>
-      <p:cxnSp>
-        <p:nvCxnSpPr>
-          <p:cNvPr id="103" name="Verbinder: gewinkelt 102">
-            <a:extLst>
-              <a:ext uri="{FF2B5EF4-FFF2-40B4-BE49-F238E27FC236}">
-                <a16:creationId xmlns:a16="http://schemas.microsoft.com/office/drawing/2014/main" id="{3BEBF514-5690-4110-8C1C-F223A78EF6B9}"/>
-              </a:ext>
-            </a:extLst>
-          </p:cNvPr>
-          <p:cNvCxnSpPr>
-            <a:cxnSpLocks/>
-          </p:cNvCxnSpPr>
-          <p:nvPr/>
-        </p:nvCxnSpPr>
-        <p:spPr>
-          <a:xfrm flipV="1">
-            <a:off x="4732999" y="831859"/>
-            <a:ext cx="3670050" cy="2328"/>
-          </a:xfrm>
-          <a:prstGeom prst="bentConnector3">
-            <a:avLst>
-              <a:gd name="adj1" fmla="val 50000"/>
-            </a:avLst>
-          </a:prstGeom>
-          <a:ln w="57150">
-            <a:solidFill>
-              <a:srgbClr val="7030A0"/>
-            </a:solidFill>
-            <a:headEnd type="triangle"/>
-            <a:tailEnd type="triangle"/>
-          </a:ln>
-        </p:spPr>
-        <p:style>
-          <a:lnRef idx="1">
-            <a:schemeClr val="accent1"/>
-          </a:lnRef>
-          <a:fillRef idx="0">
-            <a:schemeClr val="accent1"/>
-          </a:fillRef>
-          <a:effectRef idx="0">
-            <a:schemeClr val="accent1"/>
-          </a:effectRef>
-          <a:fontRef idx="minor">
-            <a:schemeClr val="tx1"/>
-          </a:fontRef>
-        </p:style>
-      </p:cxnSp>
     </p:spTree>
     <p:extLst>
       <p:ext uri="{BB962C8B-B14F-4D97-AF65-F5344CB8AC3E}">
-        <p14:creationId xmlns:p14="http://schemas.microsoft.com/office/powerpoint/2010/main" val="2534709350"/>
+        <p14:creationId xmlns:p14="http://schemas.microsoft.com/office/powerpoint/2010/main" val="94477974"/>
       </p:ext>
     </p:extLst>
   </p:cSld>

</xml_diff>